<commit_message>
rebound internal diff boomerang
</commit_message>
<xml_diff>
--- a/round3.pptx
+++ b/round3.pptx
@@ -5,7 +5,7 @@
     <p:sldMasterId id="2147483648" r:id="rId1"/>
   </p:sldMasterIdLst>
   <p:notesMasterIdLst>
-    <p:notesMasterId r:id="rId56"/>
+    <p:notesMasterId r:id="rId61"/>
   </p:notesMasterIdLst>
   <p:sldIdLst>
     <p:sldId id="256" r:id="rId2"/>
@@ -19,8 +19,8 @@
     <p:sldId id="271" r:id="rId10"/>
     <p:sldId id="278" r:id="rId11"/>
     <p:sldId id="272" r:id="rId12"/>
-    <p:sldId id="311" r:id="rId13"/>
-    <p:sldId id="273" r:id="rId14"/>
+    <p:sldId id="273" r:id="rId13"/>
+    <p:sldId id="311" r:id="rId14"/>
     <p:sldId id="275" r:id="rId15"/>
     <p:sldId id="276" r:id="rId16"/>
     <p:sldId id="277" r:id="rId17"/>
@@ -51,17 +51,22 @@
     <p:sldId id="317" r:id="rId42"/>
     <p:sldId id="319" r:id="rId43"/>
     <p:sldId id="320" r:id="rId44"/>
-    <p:sldId id="331" r:id="rId45"/>
-    <p:sldId id="318" r:id="rId46"/>
-    <p:sldId id="259" r:id="rId47"/>
-    <p:sldId id="298" r:id="rId48"/>
-    <p:sldId id="263" r:id="rId49"/>
-    <p:sldId id="302" r:id="rId50"/>
-    <p:sldId id="264" r:id="rId51"/>
-    <p:sldId id="303" r:id="rId52"/>
-    <p:sldId id="265" r:id="rId53"/>
-    <p:sldId id="260" r:id="rId54"/>
-    <p:sldId id="312" r:id="rId55"/>
+    <p:sldId id="318" r:id="rId45"/>
+    <p:sldId id="259" r:id="rId46"/>
+    <p:sldId id="298" r:id="rId47"/>
+    <p:sldId id="263" r:id="rId48"/>
+    <p:sldId id="302" r:id="rId49"/>
+    <p:sldId id="264" r:id="rId50"/>
+    <p:sldId id="303" r:id="rId51"/>
+    <p:sldId id="265" r:id="rId52"/>
+    <p:sldId id="260" r:id="rId53"/>
+    <p:sldId id="332" r:id="rId54"/>
+    <p:sldId id="336" r:id="rId55"/>
+    <p:sldId id="331" r:id="rId56"/>
+    <p:sldId id="333" r:id="rId57"/>
+    <p:sldId id="334" r:id="rId58"/>
+    <p:sldId id="335" r:id="rId59"/>
+    <p:sldId id="312" r:id="rId60"/>
   </p:sldIdLst>
   <p:sldSz cx="12192000" cy="6858000"/>
   <p:notesSz cx="6858000" cy="9144000"/>
@@ -2005,7 +2010,7 @@
           <a:p>
             <a:fld id="{1320BD0E-5109-46F8-A5B6-62A588708CC4}" type="datetimeFigureOut">
               <a:rPr lang="zh-CN" altLang="en-US" smtClean="0"/>
-              <a:t>2021/6/22</a:t>
+              <a:t>2021/6/27</a:t>
             </a:fld>
             <a:endParaRPr lang="zh-CN" altLang="en-US"/>
           </a:p>
@@ -2737,7 +2742,7 @@
           <a:p>
             <a:fld id="{14429FF0-3023-43B6-9AAB-81DD03F4275D}" type="datetimeFigureOut">
               <a:rPr lang="zh-CN" altLang="en-US" smtClean="0"/>
-              <a:t>2021/6/22</a:t>
+              <a:t>2021/6/27</a:t>
             </a:fld>
             <a:endParaRPr lang="zh-CN" altLang="en-US"/>
           </a:p>
@@ -2905,7 +2910,7 @@
           <a:p>
             <a:fld id="{14429FF0-3023-43B6-9AAB-81DD03F4275D}" type="datetimeFigureOut">
               <a:rPr lang="zh-CN" altLang="en-US" smtClean="0"/>
-              <a:t>2021/6/22</a:t>
+              <a:t>2021/6/27</a:t>
             </a:fld>
             <a:endParaRPr lang="zh-CN" altLang="en-US"/>
           </a:p>
@@ -3083,7 +3088,7 @@
           <a:p>
             <a:fld id="{14429FF0-3023-43B6-9AAB-81DD03F4275D}" type="datetimeFigureOut">
               <a:rPr lang="zh-CN" altLang="en-US" smtClean="0"/>
-              <a:t>2021/6/22</a:t>
+              <a:t>2021/6/27</a:t>
             </a:fld>
             <a:endParaRPr lang="zh-CN" altLang="en-US"/>
           </a:p>
@@ -3251,7 +3256,7 @@
           <a:p>
             <a:fld id="{14429FF0-3023-43B6-9AAB-81DD03F4275D}" type="datetimeFigureOut">
               <a:rPr lang="zh-CN" altLang="en-US" smtClean="0"/>
-              <a:t>2021/6/22</a:t>
+              <a:t>2021/6/27</a:t>
             </a:fld>
             <a:endParaRPr lang="zh-CN" altLang="en-US"/>
           </a:p>
@@ -3496,7 +3501,7 @@
           <a:p>
             <a:fld id="{14429FF0-3023-43B6-9AAB-81DD03F4275D}" type="datetimeFigureOut">
               <a:rPr lang="zh-CN" altLang="en-US" smtClean="0"/>
-              <a:t>2021/6/22</a:t>
+              <a:t>2021/6/27</a:t>
             </a:fld>
             <a:endParaRPr lang="zh-CN" altLang="en-US"/>
           </a:p>
@@ -3725,7 +3730,7 @@
           <a:p>
             <a:fld id="{14429FF0-3023-43B6-9AAB-81DD03F4275D}" type="datetimeFigureOut">
               <a:rPr lang="zh-CN" altLang="en-US" smtClean="0"/>
-              <a:t>2021/6/22</a:t>
+              <a:t>2021/6/27</a:t>
             </a:fld>
             <a:endParaRPr lang="zh-CN" altLang="en-US"/>
           </a:p>
@@ -4089,7 +4094,7 @@
           <a:p>
             <a:fld id="{14429FF0-3023-43B6-9AAB-81DD03F4275D}" type="datetimeFigureOut">
               <a:rPr lang="zh-CN" altLang="en-US" smtClean="0"/>
-              <a:t>2021/6/22</a:t>
+              <a:t>2021/6/27</a:t>
             </a:fld>
             <a:endParaRPr lang="zh-CN" altLang="en-US"/>
           </a:p>
@@ -4206,7 +4211,7 @@
           <a:p>
             <a:fld id="{14429FF0-3023-43B6-9AAB-81DD03F4275D}" type="datetimeFigureOut">
               <a:rPr lang="zh-CN" altLang="en-US" smtClean="0"/>
-              <a:t>2021/6/22</a:t>
+              <a:t>2021/6/27</a:t>
             </a:fld>
             <a:endParaRPr lang="zh-CN" altLang="en-US"/>
           </a:p>
@@ -4301,7 +4306,7 @@
           <a:p>
             <a:fld id="{14429FF0-3023-43B6-9AAB-81DD03F4275D}" type="datetimeFigureOut">
               <a:rPr lang="zh-CN" altLang="en-US" smtClean="0"/>
-              <a:t>2021/6/22</a:t>
+              <a:t>2021/6/27</a:t>
             </a:fld>
             <a:endParaRPr lang="zh-CN" altLang="en-US"/>
           </a:p>
@@ -4576,7 +4581,7 @@
           <a:p>
             <a:fld id="{14429FF0-3023-43B6-9AAB-81DD03F4275D}" type="datetimeFigureOut">
               <a:rPr lang="zh-CN" altLang="en-US" smtClean="0"/>
-              <a:t>2021/6/22</a:t>
+              <a:t>2021/6/27</a:t>
             </a:fld>
             <a:endParaRPr lang="zh-CN" altLang="en-US"/>
           </a:p>
@@ -4828,7 +4833,7 @@
           <a:p>
             <a:fld id="{14429FF0-3023-43B6-9AAB-81DD03F4275D}" type="datetimeFigureOut">
               <a:rPr lang="zh-CN" altLang="en-US" smtClean="0"/>
-              <a:t>2021/6/22</a:t>
+              <a:t>2021/6/27</a:t>
             </a:fld>
             <a:endParaRPr lang="zh-CN" altLang="en-US"/>
           </a:p>
@@ -5039,7 +5044,7 @@
           <a:p>
             <a:fld id="{14429FF0-3023-43B6-9AAB-81DD03F4275D}" type="datetimeFigureOut">
               <a:rPr lang="zh-CN" altLang="en-US" smtClean="0"/>
-              <a:t>2021/6/22</a:t>
+              <a:t>2021/6/27</a:t>
             </a:fld>
             <a:endParaRPr lang="zh-CN" altLang="en-US" dirty="0"/>
           </a:p>
@@ -5430,6 +5435,14 @@
 <file path=ppt/slides/slide1.xml><?xml version="1.0" encoding="utf-8"?>
 <p:sld xmlns:a="http://schemas.openxmlformats.org/drawingml/2006/main" xmlns:r="http://schemas.openxmlformats.org/officeDocument/2006/relationships" xmlns:p="http://schemas.openxmlformats.org/presentationml/2006/main">
   <p:cSld>
+    <p:bg>
+      <p:bgPr>
+        <a:solidFill>
+          <a:srgbClr val="5B9BD5"/>
+        </a:solidFill>
+        <a:effectLst/>
+      </p:bgPr>
+    </p:bg>
     <p:spTree>
       <p:nvGrpSpPr>
         <p:cNvPr id="1" name=""/>
@@ -5469,7 +5482,13 @@
       </p:sp>
       <p:sp>
         <p:nvSpPr>
-          <p:cNvPr id="3" name="副标题 2"/>
+          <p:cNvPr id="4" name="副标题 3">
+            <a:extLst>
+              <a:ext uri="{FF2B5EF4-FFF2-40B4-BE49-F238E27FC236}">
+                <a16:creationId xmlns:a16="http://schemas.microsoft.com/office/drawing/2014/main" id="{E66BF7A5-F537-4978-AD0D-61ECF612E714}"/>
+              </a:ext>
+            </a:extLst>
+          </p:cNvPr>
           <p:cNvSpPr>
             <a:spLocks noGrp="1"/>
           </p:cNvSpPr>
@@ -5482,7 +5501,7 @@
           <a:bodyPr/>
           <a:lstStyle/>
           <a:p>
-            <a:endParaRPr lang="zh-CN" altLang="en-US"/>
+            <a:endParaRPr lang="zh-CN" altLang="en-US" dirty="0"/>
           </a:p>
         </p:txBody>
       </p:sp>
@@ -5947,174 +5966,6 @@
       </p:grpSpPr>
       <p:sp>
         <p:nvSpPr>
-          <p:cNvPr id="2" name="标题 1"/>
-          <p:cNvSpPr>
-            <a:spLocks noGrp="1"/>
-          </p:cNvSpPr>
-          <p:nvPr>
-            <p:ph type="title"/>
-          </p:nvPr>
-        </p:nvSpPr>
-        <p:spPr/>
-        <p:txBody>
-          <a:bodyPr/>
-          <a:lstStyle/>
-          <a:p>
-            <a:r>
-              <a:rPr lang="en-US" altLang="zh-CN" dirty="0"/>
-              <a:t>PHOTON</a:t>
-            </a:r>
-            <a:endParaRPr lang="zh-CN" altLang="en-US" dirty="0"/>
-          </a:p>
-        </p:txBody>
-      </p:sp>
-      <p:pic>
-        <p:nvPicPr>
-          <p:cNvPr id="4" name="图片 3"/>
-          <p:cNvPicPr>
-            <a:picLocks noChangeAspect="1"/>
-          </p:cNvPicPr>
-          <p:nvPr/>
-        </p:nvPicPr>
-        <p:blipFill>
-          <a:blip r:embed="rId2"/>
-          <a:stretch>
-            <a:fillRect/>
-          </a:stretch>
-        </p:blipFill>
-        <p:spPr>
-          <a:xfrm>
-            <a:off x="602364" y="2554332"/>
-            <a:ext cx="10987271" cy="2756282"/>
-          </a:xfrm>
-          <a:prstGeom prst="rect">
-            <a:avLst/>
-          </a:prstGeom>
-        </p:spPr>
-      </p:pic>
-      <p:sp>
-        <p:nvSpPr>
-          <p:cNvPr id="5" name="动作按钮: 第一张 4">
-            <a:hlinkClick r:id="rId3" action="ppaction://hlinksldjump" highlightClick="1"/>
-          </p:cNvPr>
-          <p:cNvSpPr/>
-          <p:nvPr/>
-        </p:nvSpPr>
-        <p:spPr>
-          <a:xfrm>
-            <a:off x="11808069" y="6541477"/>
-            <a:ext cx="383931" cy="316523"/>
-          </a:xfrm>
-          <a:prstGeom prst="actionButtonHome">
-            <a:avLst/>
-          </a:prstGeom>
-        </p:spPr>
-        <p:style>
-          <a:lnRef idx="2">
-            <a:schemeClr val="accent1">
-              <a:shade val="50000"/>
-            </a:schemeClr>
-          </a:lnRef>
-          <a:fillRef idx="1">
-            <a:schemeClr val="accent1"/>
-          </a:fillRef>
-          <a:effectRef idx="0">
-            <a:schemeClr val="accent1"/>
-          </a:effectRef>
-          <a:fontRef idx="minor">
-            <a:schemeClr val="lt1"/>
-          </a:fontRef>
-        </p:style>
-        <p:txBody>
-          <a:bodyPr rtlCol="0" anchor="ctr"/>
-          <a:lstStyle/>
-          <a:p>
-            <a:pPr algn="ctr"/>
-            <a:endParaRPr lang="zh-CN" altLang="en-US"/>
-          </a:p>
-        </p:txBody>
-      </p:sp>
-      <p:pic>
-        <p:nvPicPr>
-          <p:cNvPr id="6" name="图片 5"/>
-          <p:cNvPicPr>
-            <a:picLocks noChangeAspect="1"/>
-          </p:cNvPicPr>
-          <p:nvPr/>
-        </p:nvPicPr>
-        <p:blipFill>
-          <a:blip r:embed="rId4"/>
-          <a:stretch>
-            <a:fillRect/>
-          </a:stretch>
-        </p:blipFill>
-        <p:spPr>
-          <a:xfrm>
-            <a:off x="3987644" y="365125"/>
-            <a:ext cx="7366156" cy="1806582"/>
-          </a:xfrm>
-          <a:prstGeom prst="rect">
-            <a:avLst/>
-          </a:prstGeom>
-        </p:spPr>
-      </p:pic>
-      <p:sp>
-        <p:nvSpPr>
-          <p:cNvPr id="8" name="内容占位符 7">
-            <a:extLst>
-              <a:ext uri="{FF2B5EF4-FFF2-40B4-BE49-F238E27FC236}">
-                <a16:creationId xmlns:a16="http://schemas.microsoft.com/office/drawing/2014/main" id="{7AD7FEE8-B0E9-43A9-B4B2-1F395CFCDAD8}"/>
-              </a:ext>
-            </a:extLst>
-          </p:cNvPr>
-          <p:cNvSpPr>
-            <a:spLocks noGrp="1"/>
-          </p:cNvSpPr>
-          <p:nvPr>
-            <p:ph idx="1"/>
-          </p:nvPr>
-        </p:nvSpPr>
-        <p:spPr/>
-        <p:txBody>
-          <a:bodyPr/>
-          <a:lstStyle/>
-          <a:p>
-            <a:endParaRPr lang="zh-CN" altLang="en-US"/>
-          </a:p>
-        </p:txBody>
-      </p:sp>
-    </p:spTree>
-    <p:extLst>
-      <p:ext uri="{BB962C8B-B14F-4D97-AF65-F5344CB8AC3E}">
-        <p14:creationId xmlns:p14="http://schemas.microsoft.com/office/powerpoint/2010/main" val="2522391752"/>
-      </p:ext>
-    </p:extLst>
-  </p:cSld>
-  <p:clrMapOvr>
-    <a:masterClrMapping/>
-  </p:clrMapOvr>
-</p:sld>
-</file>
-
-<file path=ppt/slides/slide13.xml><?xml version="1.0" encoding="utf-8"?>
-<p:sld xmlns:a="http://schemas.openxmlformats.org/drawingml/2006/main" xmlns:r="http://schemas.openxmlformats.org/officeDocument/2006/relationships" xmlns:p="http://schemas.openxmlformats.org/presentationml/2006/main">
-  <p:cSld>
-    <p:spTree>
-      <p:nvGrpSpPr>
-        <p:cNvPr id="1" name=""/>
-        <p:cNvGrpSpPr/>
-        <p:nvPr/>
-      </p:nvGrpSpPr>
-      <p:grpSpPr>
-        <a:xfrm>
-          <a:off x="0" y="0"/>
-          <a:ext cx="0" cy="0"/>
-          <a:chOff x="0" y="0"/>
-          <a:chExt cx="0" cy="0"/>
-        </a:xfrm>
-      </p:grpSpPr>
-      <p:sp>
-        <p:nvSpPr>
           <p:cNvPr id="2" name="标题 1">
             <a:extLst>
               <a:ext uri="{FF2B5EF4-FFF2-40B4-BE49-F238E27FC236}">
@@ -6287,6 +6138,174 @@
 </p:sld>
 </file>
 
+<file path=ppt/slides/slide13.xml><?xml version="1.0" encoding="utf-8"?>
+<p:sld xmlns:a="http://schemas.openxmlformats.org/drawingml/2006/main" xmlns:r="http://schemas.openxmlformats.org/officeDocument/2006/relationships" xmlns:p="http://schemas.openxmlformats.org/presentationml/2006/main">
+  <p:cSld>
+    <p:spTree>
+      <p:nvGrpSpPr>
+        <p:cNvPr id="1" name=""/>
+        <p:cNvGrpSpPr/>
+        <p:nvPr/>
+      </p:nvGrpSpPr>
+      <p:grpSpPr>
+        <a:xfrm>
+          <a:off x="0" y="0"/>
+          <a:ext cx="0" cy="0"/>
+          <a:chOff x="0" y="0"/>
+          <a:chExt cx="0" cy="0"/>
+        </a:xfrm>
+      </p:grpSpPr>
+      <p:sp>
+        <p:nvSpPr>
+          <p:cNvPr id="2" name="标题 1"/>
+          <p:cNvSpPr>
+            <a:spLocks noGrp="1"/>
+          </p:cNvSpPr>
+          <p:nvPr>
+            <p:ph type="title"/>
+          </p:nvPr>
+        </p:nvSpPr>
+        <p:spPr/>
+        <p:txBody>
+          <a:bodyPr/>
+          <a:lstStyle/>
+          <a:p>
+            <a:r>
+              <a:rPr lang="en-US" altLang="zh-CN" dirty="0"/>
+              <a:t>PHOTON</a:t>
+            </a:r>
+            <a:endParaRPr lang="zh-CN" altLang="en-US" dirty="0"/>
+          </a:p>
+        </p:txBody>
+      </p:sp>
+      <p:pic>
+        <p:nvPicPr>
+          <p:cNvPr id="4" name="图片 3"/>
+          <p:cNvPicPr>
+            <a:picLocks noChangeAspect="1"/>
+          </p:cNvPicPr>
+          <p:nvPr/>
+        </p:nvPicPr>
+        <p:blipFill>
+          <a:blip r:embed="rId2"/>
+          <a:stretch>
+            <a:fillRect/>
+          </a:stretch>
+        </p:blipFill>
+        <p:spPr>
+          <a:xfrm>
+            <a:off x="602364" y="2554332"/>
+            <a:ext cx="10987271" cy="2756282"/>
+          </a:xfrm>
+          <a:prstGeom prst="rect">
+            <a:avLst/>
+          </a:prstGeom>
+        </p:spPr>
+      </p:pic>
+      <p:sp>
+        <p:nvSpPr>
+          <p:cNvPr id="5" name="动作按钮: 第一张 4">
+            <a:hlinkClick r:id="rId3" action="ppaction://hlinksldjump" highlightClick="1"/>
+          </p:cNvPr>
+          <p:cNvSpPr/>
+          <p:nvPr/>
+        </p:nvSpPr>
+        <p:spPr>
+          <a:xfrm>
+            <a:off x="11808069" y="6541477"/>
+            <a:ext cx="383931" cy="316523"/>
+          </a:xfrm>
+          <a:prstGeom prst="actionButtonHome">
+            <a:avLst/>
+          </a:prstGeom>
+        </p:spPr>
+        <p:style>
+          <a:lnRef idx="2">
+            <a:schemeClr val="accent1">
+              <a:shade val="50000"/>
+            </a:schemeClr>
+          </a:lnRef>
+          <a:fillRef idx="1">
+            <a:schemeClr val="accent1"/>
+          </a:fillRef>
+          <a:effectRef idx="0">
+            <a:schemeClr val="accent1"/>
+          </a:effectRef>
+          <a:fontRef idx="minor">
+            <a:schemeClr val="lt1"/>
+          </a:fontRef>
+        </p:style>
+        <p:txBody>
+          <a:bodyPr rtlCol="0" anchor="ctr"/>
+          <a:lstStyle/>
+          <a:p>
+            <a:pPr algn="ctr"/>
+            <a:endParaRPr lang="zh-CN" altLang="en-US"/>
+          </a:p>
+        </p:txBody>
+      </p:sp>
+      <p:pic>
+        <p:nvPicPr>
+          <p:cNvPr id="6" name="图片 5"/>
+          <p:cNvPicPr>
+            <a:picLocks noChangeAspect="1"/>
+          </p:cNvPicPr>
+          <p:nvPr/>
+        </p:nvPicPr>
+        <p:blipFill>
+          <a:blip r:embed="rId4"/>
+          <a:stretch>
+            <a:fillRect/>
+          </a:stretch>
+        </p:blipFill>
+        <p:spPr>
+          <a:xfrm>
+            <a:off x="3987644" y="365125"/>
+            <a:ext cx="7366156" cy="1806582"/>
+          </a:xfrm>
+          <a:prstGeom prst="rect">
+            <a:avLst/>
+          </a:prstGeom>
+        </p:spPr>
+      </p:pic>
+      <p:sp>
+        <p:nvSpPr>
+          <p:cNvPr id="8" name="内容占位符 7">
+            <a:extLst>
+              <a:ext uri="{FF2B5EF4-FFF2-40B4-BE49-F238E27FC236}">
+                <a16:creationId xmlns:a16="http://schemas.microsoft.com/office/drawing/2014/main" id="{7AD7FEE8-B0E9-43A9-B4B2-1F395CFCDAD8}"/>
+              </a:ext>
+            </a:extLst>
+          </p:cNvPr>
+          <p:cNvSpPr>
+            <a:spLocks noGrp="1"/>
+          </p:cNvSpPr>
+          <p:nvPr>
+            <p:ph idx="1"/>
+          </p:nvPr>
+        </p:nvSpPr>
+        <p:spPr/>
+        <p:txBody>
+          <a:bodyPr/>
+          <a:lstStyle/>
+          <a:p>
+            <a:endParaRPr lang="zh-CN" altLang="en-US"/>
+          </a:p>
+        </p:txBody>
+      </p:sp>
+    </p:spTree>
+    <p:extLst>
+      <p:ext uri="{BB962C8B-B14F-4D97-AF65-F5344CB8AC3E}">
+        <p14:creationId xmlns:p14="http://schemas.microsoft.com/office/powerpoint/2010/main" val="2522391752"/>
+      </p:ext>
+    </p:extLst>
+  </p:cSld>
+  <p:clrMapOvr>
+    <a:masterClrMapping/>
+  </p:clrMapOvr>
+</p:sld>
+</file>
+
 <file path=ppt/slides/slide14.xml><?xml version="1.0" encoding="utf-8"?>
 <p:sld xmlns:a="http://schemas.openxmlformats.org/drawingml/2006/main" xmlns:r="http://schemas.openxmlformats.org/officeDocument/2006/relationships" xmlns:p="http://schemas.openxmlformats.org/presentationml/2006/main">
   <p:cSld>
@@ -7041,12 +7060,18 @@
       </p:sp>
       <p:sp>
         <p:nvSpPr>
-          <p:cNvPr id="3" name="内容占位符 2"/>
+          <p:cNvPr id="4" name="文本占位符 3">
+            <a:extLst>
+              <a:ext uri="{FF2B5EF4-FFF2-40B4-BE49-F238E27FC236}">
+                <a16:creationId xmlns:a16="http://schemas.microsoft.com/office/drawing/2014/main" id="{012580ED-454D-4CFA-93F8-BC9897503E48}"/>
+              </a:ext>
+            </a:extLst>
+          </p:cNvPr>
           <p:cNvSpPr>
             <a:spLocks noGrp="1"/>
           </p:cNvSpPr>
           <p:nvPr>
-            <p:ph idx="1"/>
+            <p:ph type="body" idx="1"/>
           </p:nvPr>
         </p:nvSpPr>
         <p:spPr/>
@@ -7054,7 +7079,23 @@
           <a:bodyPr/>
           <a:lstStyle/>
           <a:p>
-            <a:endParaRPr lang="zh-CN" altLang="en-US"/>
+            <a:r>
+              <a:rPr lang="en-US" altLang="zh-CN" dirty="0">
+                <a:solidFill>
+                  <a:schemeClr val="accent2">
+                    <a:lumMod val="75000"/>
+                  </a:schemeClr>
+                </a:solidFill>
+              </a:rPr>
+              <a:t>Grouped by primitives</a:t>
+            </a:r>
+            <a:endParaRPr lang="zh-CN" altLang="en-US" dirty="0">
+              <a:solidFill>
+                <a:schemeClr val="accent2">
+                  <a:lumMod val="75000"/>
+                </a:schemeClr>
+              </a:solidFill>
+            </a:endParaRPr>
           </a:p>
         </p:txBody>
       </p:sp>
@@ -12307,12 +12348,12 @@
                     <a:p>
                       <a:pPr algn="l" fontAlgn="b"/>
                       <a:r>
-                        <a:rPr lang="en-US" sz="1500" u="none" strike="noStrike">
+                        <a:rPr lang="en-US" sz="1500" u="none" strike="noStrike" dirty="0">
                           <a:effectLst/>
                         </a:rPr>
                         <a:t>Ascon-p</a:t>
                       </a:r>
-                      <a:endParaRPr lang="en-US" sz="1500" b="0" i="0" u="none" strike="noStrike">
+                      <a:endParaRPr lang="en-US" sz="1500" b="0" i="0" u="none" strike="noStrike" dirty="0">
                         <a:solidFill>
                           <a:srgbClr val="000000"/>
                         </a:solidFill>
@@ -12358,12 +12399,12 @@
                     <a:p>
                       <a:pPr algn="r" fontAlgn="b"/>
                       <a:r>
-                        <a:rPr lang="en-US" altLang="zh-CN" sz="1500" u="none" strike="noStrike">
+                        <a:rPr lang="en-US" altLang="zh-CN" sz="1500" u="none" strike="noStrike" dirty="0">
                           <a:effectLst/>
                         </a:rPr>
                         <a:t>5</a:t>
                       </a:r>
-                      <a:endParaRPr lang="en-US" altLang="zh-CN" sz="1500" b="0" i="0" u="none" strike="noStrike">
+                      <a:endParaRPr lang="en-US" altLang="zh-CN" sz="1500" b="0" i="0" u="none" strike="noStrike" dirty="0">
                         <a:solidFill>
                           <a:srgbClr val="000000"/>
                         </a:solidFill>
@@ -12382,12 +12423,12 @@
                     <a:p>
                       <a:pPr algn="r" fontAlgn="b"/>
                       <a:r>
-                        <a:rPr lang="en-US" altLang="zh-CN" sz="1500" u="none" strike="noStrike">
+                        <a:rPr lang="en-US" altLang="zh-CN" sz="1500" u="none" strike="noStrike" dirty="0">
                           <a:effectLst/>
                         </a:rPr>
                         <a:t>5</a:t>
                       </a:r>
-                      <a:endParaRPr lang="en-US" altLang="zh-CN" sz="1500" b="0" i="0" u="none" strike="noStrike">
+                      <a:endParaRPr lang="en-US" altLang="zh-CN" sz="1500" b="0" i="0" u="none" strike="noStrike" dirty="0">
                         <a:solidFill>
                           <a:srgbClr val="000000"/>
                         </a:solidFill>
@@ -12406,12 +12447,12 @@
                     <a:p>
                       <a:pPr algn="r" fontAlgn="b"/>
                       <a:r>
-                        <a:rPr lang="en-US" altLang="zh-CN" sz="1500" u="none" strike="noStrike">
+                        <a:rPr lang="en-US" altLang="zh-CN" sz="1500" u="none" strike="noStrike" dirty="0">
                           <a:effectLst/>
                         </a:rPr>
                         <a:t>11</a:t>
                       </a:r>
-                      <a:endParaRPr lang="en-US" altLang="zh-CN" sz="1500" b="0" i="0" u="none" strike="noStrike">
+                      <a:endParaRPr lang="en-US" altLang="zh-CN" sz="1500" b="0" i="0" u="none" strike="noStrike" dirty="0">
                         <a:solidFill>
                           <a:srgbClr val="000000"/>
                         </a:solidFill>
@@ -12430,12 +12471,12 @@
                     <a:p>
                       <a:pPr algn="r" fontAlgn="b"/>
                       <a:r>
-                        <a:rPr lang="en-US" altLang="zh-CN" sz="1500" u="none" strike="noStrike">
+                        <a:rPr lang="en-US" altLang="zh-CN" sz="1500" u="none" strike="noStrike" dirty="0">
                           <a:effectLst/>
                         </a:rPr>
                         <a:t>12</a:t>
                       </a:r>
-                      <a:endParaRPr lang="en-US" altLang="zh-CN" sz="1500" b="0" i="0" u="none" strike="noStrike">
+                      <a:endParaRPr lang="en-US" altLang="zh-CN" sz="1500" b="0" i="0" u="none" strike="noStrike" dirty="0">
                         <a:solidFill>
                           <a:srgbClr val="000000"/>
                         </a:solidFill>
@@ -12454,12 +12495,12 @@
                     <a:p>
                       <a:pPr algn="r" fontAlgn="b"/>
                       <a:r>
-                        <a:rPr lang="en-US" altLang="zh-CN" sz="1500" u="none" strike="noStrike">
+                        <a:rPr lang="en-US" altLang="zh-CN" sz="1500" u="none" strike="noStrike" dirty="0">
                           <a:effectLst/>
                         </a:rPr>
                         <a:t>7</a:t>
                       </a:r>
-                      <a:endParaRPr lang="en-US" altLang="zh-CN" sz="1500" b="0" i="0" u="none" strike="noStrike">
+                      <a:endParaRPr lang="en-US" altLang="zh-CN" sz="1500" b="0" i="0" u="none" strike="noStrike" dirty="0">
                         <a:solidFill>
                           <a:srgbClr val="000000"/>
                         </a:solidFill>
@@ -12477,7 +12518,7 @@
                     <a:lstStyle/>
                     <a:p>
                       <a:pPr algn="l" fontAlgn="b"/>
-                      <a:endParaRPr lang="zh-CN" altLang="en-US" sz="1500" b="0" i="0" u="none" strike="noStrike">
+                      <a:endParaRPr lang="zh-CN" altLang="en-US" sz="1500" b="0" i="0" u="none" strike="noStrike" dirty="0">
                         <a:solidFill>
                           <a:srgbClr val="000000"/>
                         </a:solidFill>
@@ -12503,12 +12544,12 @@
                     <a:p>
                       <a:pPr algn="l" fontAlgn="b"/>
                       <a:r>
-                        <a:rPr lang="en-US" sz="1500" u="none" strike="noStrike">
+                        <a:rPr lang="en-US" sz="1500" u="none" strike="noStrike" dirty="0">
                           <a:effectLst/>
                         </a:rPr>
                         <a:t>Keccak-f</a:t>
                       </a:r>
-                      <a:endParaRPr lang="en-US" sz="1500" b="0" i="0" u="none" strike="noStrike">
+                      <a:endParaRPr lang="en-US" sz="1500" b="0" i="0" u="none" strike="noStrike" dirty="0">
                         <a:solidFill>
                           <a:srgbClr val="000000"/>
                         </a:solidFill>
@@ -12940,12 +12981,12 @@
                     <a:p>
                       <a:pPr algn="r" fontAlgn="b"/>
                       <a:r>
-                        <a:rPr lang="en-US" altLang="zh-CN" sz="1500" u="none" strike="noStrike">
+                        <a:rPr lang="en-US" altLang="zh-CN" sz="1500" u="none" strike="noStrike" dirty="0">
                           <a:effectLst/>
                         </a:rPr>
                         <a:t>46</a:t>
                       </a:r>
-                      <a:endParaRPr lang="en-US" altLang="zh-CN" sz="1500" b="0" i="0" u="none" strike="noStrike">
+                      <a:endParaRPr lang="en-US" altLang="zh-CN" sz="1500" b="0" i="0" u="none" strike="noStrike" dirty="0">
                         <a:solidFill>
                           <a:srgbClr val="000000"/>
                         </a:solidFill>
@@ -13054,12 +13095,12 @@
                     <a:p>
                       <a:pPr algn="r" fontAlgn="b"/>
                       <a:r>
-                        <a:rPr lang="en-US" altLang="zh-CN" sz="1500" u="none" strike="noStrike">
+                        <a:rPr lang="en-US" altLang="zh-CN" sz="1500" u="none" strike="noStrike" dirty="0">
                           <a:effectLst/>
                         </a:rPr>
                         <a:t>19</a:t>
                       </a:r>
-                      <a:endParaRPr lang="en-US" altLang="zh-CN" sz="1500" b="0" i="0" u="none" strike="noStrike">
+                      <a:endParaRPr lang="en-US" altLang="zh-CN" sz="1500" b="0" i="0" u="none" strike="noStrike" dirty="0">
                         <a:solidFill>
                           <a:srgbClr val="000000"/>
                         </a:solidFill>
@@ -13136,12 +13177,12 @@
                     <a:p>
                       <a:pPr algn="r" fontAlgn="b"/>
                       <a:r>
-                        <a:rPr lang="en-US" altLang="zh-CN" sz="1500" u="none" strike="noStrike">
+                        <a:rPr lang="en-US" altLang="zh-CN" sz="1500" u="none" strike="noStrike" dirty="0">
                           <a:effectLst/>
                         </a:rPr>
                         <a:t>27</a:t>
                       </a:r>
-                      <a:endParaRPr lang="en-US" altLang="zh-CN" sz="1500" b="0" i="0" u="none" strike="noStrike">
+                      <a:endParaRPr lang="en-US" altLang="zh-CN" sz="1500" b="0" i="0" u="none" strike="noStrike" dirty="0">
                         <a:solidFill>
                           <a:srgbClr val="000000"/>
                         </a:solidFill>
@@ -13244,12 +13285,12 @@
                     <a:p>
                       <a:pPr algn="r" fontAlgn="b"/>
                       <a:r>
-                        <a:rPr lang="en-US" altLang="zh-CN" sz="1500" u="none" strike="noStrike">
+                        <a:rPr lang="en-US" altLang="zh-CN" sz="1500" u="none" strike="noStrike" dirty="0">
                           <a:effectLst/>
                         </a:rPr>
                         <a:t>15</a:t>
                       </a:r>
-                      <a:endParaRPr lang="en-US" altLang="zh-CN" sz="1500" b="0" i="0" u="none" strike="noStrike">
+                      <a:endParaRPr lang="en-US" altLang="zh-CN" sz="1500" b="0" i="0" u="none" strike="noStrike" dirty="0">
                         <a:solidFill>
                           <a:srgbClr val="000000"/>
                         </a:solidFill>
@@ -13275,12 +13316,12 @@
                     <a:p>
                       <a:pPr algn="l" fontAlgn="b"/>
                       <a:r>
-                        <a:rPr lang="en-US" sz="1500" u="none" strike="noStrike">
+                        <a:rPr lang="en-US" sz="1500" u="none" strike="noStrike" dirty="0">
                           <a:effectLst/>
                         </a:rPr>
                         <a:t>PHOTON-256</a:t>
                       </a:r>
-                      <a:endParaRPr lang="en-US" sz="1500" b="0" i="0" u="none" strike="noStrike">
+                      <a:endParaRPr lang="en-US" sz="1500" b="0" i="0" u="none" strike="noStrike" dirty="0">
                         <a:solidFill>
                           <a:srgbClr val="000000"/>
                         </a:solidFill>
@@ -13350,12 +13391,12 @@
                     <a:p>
                       <a:pPr algn="r" fontAlgn="b"/>
                       <a:r>
-                        <a:rPr lang="en-US" altLang="zh-CN" sz="1500" u="none" strike="noStrike">
+                        <a:rPr lang="en-US" altLang="zh-CN" sz="1500" u="none" strike="noStrike" dirty="0">
                           <a:effectLst/>
                         </a:rPr>
                         <a:t>5</a:t>
                       </a:r>
-                      <a:endParaRPr lang="en-US" altLang="zh-CN" sz="1500" b="0" i="0" u="none" strike="noStrike">
+                      <a:endParaRPr lang="en-US" altLang="zh-CN" sz="1500" b="0" i="0" u="none" strike="noStrike" dirty="0">
                         <a:solidFill>
                           <a:srgbClr val="000000"/>
                         </a:solidFill>
@@ -13440,12 +13481,12 @@
                     <a:p>
                       <a:pPr algn="r" fontAlgn="b"/>
                       <a:r>
-                        <a:rPr lang="en-US" altLang="zh-CN" sz="1500" u="none" strike="noStrike">
+                        <a:rPr lang="en-US" altLang="zh-CN" sz="1500" u="none" strike="noStrike" dirty="0">
                           <a:effectLst/>
                         </a:rPr>
                         <a:t>8</a:t>
                       </a:r>
-                      <a:endParaRPr lang="en-US" altLang="zh-CN" sz="1500" b="0" i="0" u="none" strike="noStrike">
+                      <a:endParaRPr lang="en-US" altLang="zh-CN" sz="1500" b="0" i="0" u="none" strike="noStrike" dirty="0">
                         <a:solidFill>
                           <a:srgbClr val="000000"/>
                         </a:solidFill>
@@ -13570,12 +13611,12 @@
                     <a:p>
                       <a:pPr algn="r" fontAlgn="b"/>
                       <a:r>
-                        <a:rPr lang="en-US" altLang="zh-CN" sz="1500" u="none" strike="noStrike">
+                        <a:rPr lang="en-US" altLang="zh-CN" sz="1500" u="none" strike="noStrike" dirty="0">
                           <a:effectLst/>
                         </a:rPr>
                         <a:t>11</a:t>
                       </a:r>
-                      <a:endParaRPr lang="en-US" altLang="zh-CN" sz="1500" b="0" i="0" u="none" strike="noStrike">
+                      <a:endParaRPr lang="en-US" altLang="zh-CN" sz="1500" b="0" i="0" u="none" strike="noStrike" dirty="0">
                         <a:solidFill>
                           <a:srgbClr val="000000"/>
                         </a:solidFill>
@@ -13630,12 +13671,12 @@
                     <a:p>
                       <a:pPr algn="r" fontAlgn="b"/>
                       <a:r>
-                        <a:rPr lang="en-US" altLang="zh-CN" sz="1500" u="none" strike="noStrike">
+                        <a:rPr lang="en-US" altLang="zh-CN" sz="1500" u="none" strike="noStrike" dirty="0">
                           <a:effectLst/>
                         </a:rPr>
                         <a:t>22</a:t>
                       </a:r>
-                      <a:endParaRPr lang="en-US" altLang="zh-CN" sz="1500" b="0" i="0" u="none" strike="noStrike">
+                      <a:endParaRPr lang="en-US" altLang="zh-CN" sz="1500" b="0" i="0" u="none" strike="noStrike" dirty="0">
                         <a:solidFill>
                           <a:srgbClr val="000000"/>
                         </a:solidFill>
@@ -13712,12 +13753,12 @@
                     <a:p>
                       <a:pPr algn="r" fontAlgn="b"/>
                       <a:r>
-                        <a:rPr lang="en-US" altLang="zh-CN" sz="1500" u="none" strike="noStrike">
+                        <a:rPr lang="en-US" altLang="zh-CN" sz="1500" u="none" strike="noStrike" dirty="0">
                           <a:effectLst/>
                         </a:rPr>
                         <a:t>6</a:t>
                       </a:r>
-                      <a:endParaRPr lang="en-US" altLang="zh-CN" sz="1500" b="0" i="0" u="none" strike="noStrike">
+                      <a:endParaRPr lang="en-US" altLang="zh-CN" sz="1500" b="0" i="0" u="none" strike="noStrike" dirty="0">
                         <a:solidFill>
                           <a:srgbClr val="000000"/>
                         </a:solidFill>
@@ -13760,12 +13801,12 @@
                     <a:p>
                       <a:pPr algn="r" fontAlgn="b"/>
                       <a:r>
-                        <a:rPr lang="en-US" altLang="zh-CN" sz="1500" u="none" strike="noStrike">
+                        <a:rPr lang="en-US" altLang="zh-CN" sz="1500" u="none" strike="noStrike" dirty="0">
                           <a:effectLst/>
                         </a:rPr>
                         <a:t>4</a:t>
                       </a:r>
-                      <a:endParaRPr lang="en-US" altLang="zh-CN" sz="1500" b="0" i="0" u="none" strike="noStrike">
+                      <a:endParaRPr lang="en-US" altLang="zh-CN" sz="1500" b="0" i="0" u="none" strike="noStrike" dirty="0">
                         <a:solidFill>
                           <a:srgbClr val="000000"/>
                         </a:solidFill>
@@ -13896,12 +13937,12 @@
                     <a:p>
                       <a:pPr algn="r" fontAlgn="b"/>
                       <a:r>
-                        <a:rPr lang="en-US" altLang="zh-CN" sz="1500" u="none" strike="noStrike">
+                        <a:rPr lang="en-US" altLang="zh-CN" sz="1500" u="none" strike="noStrike" dirty="0">
                           <a:effectLst/>
                         </a:rPr>
                         <a:t>338</a:t>
                       </a:r>
-                      <a:endParaRPr lang="en-US" altLang="zh-CN" sz="1500" b="0" i="0" u="none" strike="noStrike">
+                      <a:endParaRPr lang="en-US" altLang="zh-CN" sz="1500" b="0" i="0" u="none" strike="noStrike" dirty="0">
                         <a:solidFill>
                           <a:srgbClr val="000000"/>
                         </a:solidFill>
@@ -13919,7 +13960,7 @@
                     <a:lstStyle/>
                     <a:p>
                       <a:pPr algn="l" fontAlgn="b"/>
-                      <a:endParaRPr lang="zh-CN" altLang="en-US" sz="1500" b="0" i="0" u="none" strike="noStrike">
+                      <a:endParaRPr lang="zh-CN" altLang="en-US" sz="1500" b="0" i="0" u="none" strike="noStrike" dirty="0">
                         <a:solidFill>
                           <a:srgbClr val="000000"/>
                         </a:solidFill>
@@ -13937,7 +13978,7 @@
                     <a:lstStyle/>
                     <a:p>
                       <a:pPr algn="l" fontAlgn="b"/>
-                      <a:endParaRPr lang="zh-CN" altLang="en-US" sz="1500" b="0" i="0" u="none" strike="noStrike">
+                      <a:endParaRPr lang="zh-CN" altLang="en-US" sz="1500" b="0" i="0" u="none" strike="noStrike" dirty="0">
                         <a:solidFill>
                           <a:srgbClr val="000000"/>
                         </a:solidFill>
@@ -13955,7 +13996,7 @@
                     <a:lstStyle/>
                     <a:p>
                       <a:pPr algn="l" fontAlgn="b"/>
-                      <a:endParaRPr lang="zh-CN" altLang="en-US" sz="1500" b="0" i="0" u="none" strike="noStrike">
+                      <a:endParaRPr lang="zh-CN" altLang="en-US" sz="1500" b="0" i="0" u="none" strike="noStrike" dirty="0">
                         <a:solidFill>
                           <a:srgbClr val="000000"/>
                         </a:solidFill>
@@ -14263,7 +14304,7 @@
         <p:spPr/>
         <p:txBody>
           <a:bodyPr>
-            <a:normAutofit lnSpcReduction="10000"/>
+            <a:normAutofit fontScale="92500"/>
           </a:bodyPr>
           <a:lstStyle/>
           <a:p>
@@ -14322,6 +14363,21 @@
             <a:r>
               <a:rPr lang="en-US" altLang="zh-CN" dirty="0">
                 <a:hlinkClick r:id="rId3" action="ppaction://hlinkfile"/>
+              </a:rPr>
+              <a:t>Improved Differential Attacks for ECHO and </a:t>
+            </a:r>
+            <a:r>
+              <a:rPr lang="en-US" altLang="zh-CN" dirty="0" err="1">
+                <a:hlinkClick r:id="rId3" action="ppaction://hlinkfile"/>
+              </a:rPr>
+              <a:t>Grøstl</a:t>
+            </a:r>
+            <a:endParaRPr lang="en-US" altLang="zh-CN" dirty="0"/>
+          </a:p>
+          <a:p>
+            <a:r>
+              <a:rPr lang="en-US" altLang="zh-CN" dirty="0">
+                <a:hlinkClick r:id="rId4" action="ppaction://hlinkfile"/>
               </a:rPr>
               <a:t>Internal Differential Boomerangs: Practical Analysis of the Round-Reduced Keccak-f Permutation</a:t>
             </a:r>
@@ -16526,306 +16582,6 @@
           <p:cNvPr id="2" name="标题 1">
             <a:extLst>
               <a:ext uri="{FF2B5EF4-FFF2-40B4-BE49-F238E27FC236}">
-                <a16:creationId xmlns:a16="http://schemas.microsoft.com/office/drawing/2014/main" id="{C60B3654-41B4-434A-9AA4-7CAC4B6DC7BE}"/>
-              </a:ext>
-            </a:extLst>
-          </p:cNvPr>
-          <p:cNvSpPr>
-            <a:spLocks noGrp="1"/>
-          </p:cNvSpPr>
-          <p:nvPr>
-            <p:ph type="title"/>
-          </p:nvPr>
-        </p:nvSpPr>
-        <p:spPr/>
-        <p:txBody>
-          <a:bodyPr/>
-          <a:lstStyle/>
-          <a:p>
-            <a:r>
-              <a:rPr lang="en-US" altLang="zh-CN" dirty="0"/>
-              <a:t>Rebound</a:t>
-            </a:r>
-            <a:endParaRPr lang="zh-CN" altLang="en-US" dirty="0"/>
-          </a:p>
-        </p:txBody>
-      </p:sp>
-      <p:sp>
-        <p:nvSpPr>
-          <p:cNvPr id="3" name="内容占位符 2">
-            <a:extLst>
-              <a:ext uri="{FF2B5EF4-FFF2-40B4-BE49-F238E27FC236}">
-                <a16:creationId xmlns:a16="http://schemas.microsoft.com/office/drawing/2014/main" id="{CDF94E2E-47EA-43D0-9826-1BD61C997212}"/>
-              </a:ext>
-            </a:extLst>
-          </p:cNvPr>
-          <p:cNvSpPr>
-            <a:spLocks noGrp="1"/>
-          </p:cNvSpPr>
-          <p:nvPr>
-            <p:ph idx="1"/>
-          </p:nvPr>
-        </p:nvSpPr>
-        <p:spPr/>
-        <p:txBody>
-          <a:bodyPr>
-            <a:normAutofit lnSpcReduction="10000"/>
-          </a:bodyPr>
-          <a:lstStyle/>
-          <a:p>
-            <a:r>
-              <a:rPr lang="en-US" altLang="zh-CN" dirty="0">
-                <a:hlinkClick r:id="rId2" action="ppaction://hlinkfile"/>
-              </a:rPr>
-              <a:t>The Rebound Attack: Cryptanalysis of Reduced Whirlpool and </a:t>
-            </a:r>
-            <a:r>
-              <a:rPr lang="en-US" altLang="zh-CN" dirty="0" err="1">
-                <a:hlinkClick r:id="rId2" action="ppaction://hlinkfile"/>
-              </a:rPr>
-              <a:t>Grøstl</a:t>
-            </a:r>
-            <a:endParaRPr lang="en-US" altLang="zh-CN" dirty="0"/>
-          </a:p>
-          <a:p>
-            <a:pPr lvl="1"/>
-            <a:r>
-              <a:rPr lang="en-US" altLang="zh-CN" dirty="0"/>
-              <a:t>09</a:t>
-            </a:r>
-            <a:r>
-              <a:rPr lang="zh-CN" altLang="en-US" dirty="0"/>
-              <a:t>年</a:t>
-            </a:r>
-            <a:r>
-              <a:rPr lang="en-US" altLang="zh-CN" dirty="0"/>
-              <a:t>Mendel</a:t>
-            </a:r>
-            <a:r>
-              <a:rPr lang="zh-CN" altLang="en-US" dirty="0"/>
-              <a:t>等提出</a:t>
-            </a:r>
-            <a:r>
-              <a:rPr lang="en-US" altLang="zh-CN" dirty="0"/>
-              <a:t>rebound</a:t>
-            </a:r>
-            <a:r>
-              <a:rPr lang="zh-CN" altLang="en-US" dirty="0"/>
-              <a:t>攻击，计算找到满足差分的一对值的复杂度</a:t>
-            </a:r>
-            <a:endParaRPr lang="en-US" altLang="zh-CN" dirty="0"/>
-          </a:p>
-          <a:p>
-            <a:pPr lvl="1"/>
-            <a:r>
-              <a:rPr lang="zh-CN" altLang="en-US" dirty="0"/>
-              <a:t>攻击了</a:t>
-            </a:r>
-            <a:r>
-              <a:rPr lang="en-US" altLang="zh-CN" dirty="0"/>
-              <a:t>7.5</a:t>
-            </a:r>
-            <a:r>
-              <a:rPr lang="zh-CN" altLang="en-US" dirty="0"/>
-              <a:t>轮</a:t>
-            </a:r>
-            <a:r>
-              <a:rPr lang="en-US" altLang="zh-CN" dirty="0"/>
-              <a:t>Whirlpool</a:t>
-            </a:r>
-            <a:r>
-              <a:rPr lang="zh-CN" altLang="en-US" dirty="0"/>
-              <a:t>，</a:t>
-            </a:r>
-            <a:r>
-              <a:rPr lang="en-US" altLang="zh-CN" dirty="0"/>
-              <a:t>8.5</a:t>
-            </a:r>
-            <a:r>
-              <a:rPr lang="zh-CN" altLang="en-US" dirty="0"/>
-              <a:t>轮</a:t>
-            </a:r>
-            <a:r>
-              <a:rPr lang="en-US" altLang="zh-CN" dirty="0"/>
-              <a:t>Maelstrom</a:t>
-            </a:r>
-            <a:r>
-              <a:rPr lang="zh-CN" altLang="en-US" dirty="0"/>
-              <a:t>，</a:t>
-            </a:r>
-            <a:r>
-              <a:rPr lang="en-US" altLang="zh-CN" dirty="0"/>
-              <a:t>6</a:t>
-            </a:r>
-            <a:r>
-              <a:rPr lang="zh-CN" altLang="en-US" dirty="0"/>
-              <a:t>轮</a:t>
-            </a:r>
-            <a:r>
-              <a:rPr lang="en-US" altLang="zh-CN" dirty="0"/>
-              <a:t>Grostl-256</a:t>
-            </a:r>
-          </a:p>
-          <a:p>
-            <a:r>
-              <a:rPr lang="en-US" altLang="zh-CN" dirty="0">
-                <a:hlinkClick r:id="rId3" action="ppaction://hlinkfile"/>
-              </a:rPr>
-              <a:t>Super-</a:t>
-            </a:r>
-            <a:r>
-              <a:rPr lang="en-US" altLang="zh-CN" dirty="0" err="1">
-                <a:hlinkClick r:id="rId3" action="ppaction://hlinkfile"/>
-              </a:rPr>
-              <a:t>Sbox</a:t>
-            </a:r>
-            <a:r>
-              <a:rPr lang="en-US" altLang="zh-CN" dirty="0">
-                <a:hlinkClick r:id="rId3" action="ppaction://hlinkfile"/>
-              </a:rPr>
-              <a:t> Cryptanalysis: Improved Attacks for AES-Like Permutations</a:t>
-            </a:r>
-            <a:endParaRPr lang="en-US" altLang="zh-CN" dirty="0"/>
-          </a:p>
-          <a:p>
-            <a:pPr lvl="1"/>
-            <a:r>
-              <a:rPr lang="zh-CN" altLang="en-US"/>
-              <a:t>将中间一轮全活跃扩展到中间两轮全活跃</a:t>
-            </a:r>
-            <a:endParaRPr lang="en-US" altLang="zh-CN" dirty="0"/>
-          </a:p>
-          <a:p>
-            <a:r>
-              <a:rPr lang="en-US" altLang="zh-CN" dirty="0">
-                <a:hlinkClick r:id="rId4" action="ppaction://hlinkfile"/>
-              </a:rPr>
-              <a:t>Improved rebound attack on the finalist </a:t>
-            </a:r>
-            <a:r>
-              <a:rPr lang="en-US" altLang="zh-CN" dirty="0" err="1">
-                <a:hlinkClick r:id="rId4" action="ppaction://hlinkfile"/>
-              </a:rPr>
-              <a:t>grøstl</a:t>
-            </a:r>
-            <a:endParaRPr lang="en-US" altLang="zh-CN" dirty="0"/>
-          </a:p>
-          <a:p>
-            <a:pPr lvl="1"/>
-            <a:r>
-              <a:rPr lang="zh-CN" altLang="en-US" dirty="0"/>
-              <a:t>将中间两轮全活跃扩展到中间三轮全活跃</a:t>
-            </a:r>
-            <a:endParaRPr lang="en-US" altLang="zh-CN" dirty="0"/>
-          </a:p>
-          <a:p>
-            <a:pPr lvl="1"/>
-            <a:r>
-              <a:rPr lang="en-US" altLang="zh-CN" dirty="0"/>
-              <a:t>9</a:t>
-            </a:r>
-            <a:r>
-              <a:rPr lang="zh-CN" altLang="en-US" dirty="0"/>
-              <a:t>轮</a:t>
-            </a:r>
-            <a:r>
-              <a:rPr lang="en-US" altLang="zh-CN" dirty="0"/>
-              <a:t>Grostl-256</a:t>
-            </a:r>
-            <a:r>
-              <a:rPr lang="zh-CN" altLang="en-US" dirty="0"/>
-              <a:t>，</a:t>
-            </a:r>
-            <a:r>
-              <a:rPr lang="en-US" altLang="zh-CN" dirty="0"/>
-              <a:t>10</a:t>
-            </a:r>
-            <a:r>
-              <a:rPr lang="zh-CN" altLang="en-US" dirty="0"/>
-              <a:t>轮</a:t>
-            </a:r>
-            <a:r>
-              <a:rPr lang="en-US" altLang="zh-CN" dirty="0"/>
-              <a:t>Grostl-512</a:t>
-            </a:r>
-            <a:r>
-              <a:rPr lang="zh-CN" altLang="en-US" dirty="0"/>
-              <a:t>，</a:t>
-            </a:r>
-            <a:r>
-              <a:rPr lang="en-US" altLang="zh-CN" dirty="0"/>
-              <a:t>PHOTON-224/32/32</a:t>
-            </a:r>
-            <a:r>
-              <a:rPr lang="zh-CN" altLang="en-US" dirty="0"/>
-              <a:t>提高了</a:t>
-            </a:r>
-            <a:r>
-              <a:rPr lang="en-US" altLang="zh-CN" dirty="0"/>
-              <a:t>1</a:t>
-            </a:r>
-            <a:r>
-              <a:rPr lang="zh-CN" altLang="en-US" dirty="0"/>
-              <a:t>轮（从</a:t>
-            </a:r>
-            <a:r>
-              <a:rPr lang="en-US" altLang="zh-CN" dirty="0"/>
-              <a:t>8</a:t>
-            </a:r>
-            <a:r>
-              <a:rPr lang="zh-CN" altLang="en-US" dirty="0"/>
-              <a:t>到</a:t>
-            </a:r>
-            <a:r>
-              <a:rPr lang="en-US" altLang="zh-CN" dirty="0"/>
-              <a:t>9</a:t>
-            </a:r>
-            <a:r>
-              <a:rPr lang="zh-CN" altLang="en-US" dirty="0"/>
-              <a:t>）</a:t>
-            </a:r>
-            <a:endParaRPr lang="en-US" altLang="zh-CN" dirty="0"/>
-          </a:p>
-          <a:p>
-            <a:endParaRPr lang="zh-CN" altLang="en-US" dirty="0"/>
-          </a:p>
-        </p:txBody>
-      </p:sp>
-    </p:spTree>
-    <p:extLst>
-      <p:ext uri="{BB962C8B-B14F-4D97-AF65-F5344CB8AC3E}">
-        <p14:creationId xmlns:p14="http://schemas.microsoft.com/office/powerpoint/2010/main" val="3869464148"/>
-      </p:ext>
-    </p:extLst>
-  </p:cSld>
-  <p:clrMapOvr>
-    <a:masterClrMapping/>
-  </p:clrMapOvr>
-</p:sld>
-</file>
-
-<file path=ppt/slides/slide45.xml><?xml version="1.0" encoding="utf-8"?>
-<p:sld xmlns:a="http://schemas.openxmlformats.org/drawingml/2006/main" xmlns:r="http://schemas.openxmlformats.org/officeDocument/2006/relationships" xmlns:p="http://schemas.openxmlformats.org/presentationml/2006/main">
-  <p:cSld>
-    <p:spTree>
-      <p:nvGrpSpPr>
-        <p:cNvPr id="1" name=""/>
-        <p:cNvGrpSpPr/>
-        <p:nvPr/>
-      </p:nvGrpSpPr>
-      <p:grpSpPr>
-        <a:xfrm>
-          <a:off x="0" y="0"/>
-          <a:ext cx="0" cy="0"/>
-          <a:chOff x="0" y="0"/>
-          <a:chExt cx="0" cy="0"/>
-        </a:xfrm>
-      </p:grpSpPr>
-      <p:sp>
-        <p:nvSpPr>
-          <p:cNvPr id="2" name="标题 1">
-            <a:extLst>
-              <a:ext uri="{FF2B5EF4-FFF2-40B4-BE49-F238E27FC236}">
                 <a16:creationId xmlns:a16="http://schemas.microsoft.com/office/drawing/2014/main" id="{CF3AF036-3634-4C4A-9118-0C2CB0D5753B}"/>
               </a:ext>
             </a:extLst>
@@ -16888,6 +16644,22 @@
             <a:endParaRPr lang="en-US" altLang="zh-CN" dirty="0"/>
           </a:p>
           <a:p>
+            <a:pPr lvl="1"/>
+            <a:r>
+              <a:rPr lang="zh-CN" altLang="en-US" dirty="0"/>
+              <a:t>积分到统计积分。</a:t>
+            </a:r>
+            <a:r>
+              <a:rPr lang="en-US" altLang="zh-CN" dirty="0"/>
+              <a:t>known-key setting</a:t>
+            </a:r>
+            <a:r>
+              <a:rPr lang="zh-CN" altLang="en-US" dirty="0"/>
+              <a:t>下，区分器扩展两轮。并通过多结构降低复杂度</a:t>
+            </a:r>
+            <a:endParaRPr lang="en-US" altLang="zh-CN" dirty="0"/>
+          </a:p>
+          <a:p>
             <a:r>
               <a:rPr lang="zh-CN" altLang="en-US" dirty="0"/>
               <a:t>零和划分</a:t>
@@ -16936,7 +16708,7 @@
 </p:sld>
 </file>
 
-<file path=ppt/slides/slide46.xml><?xml version="1.0" encoding="utf-8"?>
+<file path=ppt/slides/slide45.xml><?xml version="1.0" encoding="utf-8"?>
 <p:sld xmlns:a="http://schemas.openxmlformats.org/drawingml/2006/main" xmlns:r="http://schemas.openxmlformats.org/officeDocument/2006/relationships" xmlns:p="http://schemas.openxmlformats.org/presentationml/2006/main">
   <p:cSld>
     <p:spTree>
@@ -17168,7 +16940,7 @@
 </p:sld>
 </file>
 
-<file path=ppt/slides/slide47.xml><?xml version="1.0" encoding="utf-8"?>
+<file path=ppt/slides/slide46.xml><?xml version="1.0" encoding="utf-8"?>
 <p:sld xmlns:a="http://schemas.openxmlformats.org/drawingml/2006/main" xmlns:r="http://schemas.openxmlformats.org/officeDocument/2006/relationships" xmlns:p="http://schemas.openxmlformats.org/presentationml/2006/main">
   <p:cSld>
     <p:spTree>
@@ -17359,7 +17131,7 @@
 </p:sld>
 </file>
 
-<file path=ppt/slides/slide48.xml><?xml version="1.0" encoding="utf-8"?>
+<file path=ppt/slides/slide47.xml><?xml version="1.0" encoding="utf-8"?>
 <p:sld xmlns:a="http://schemas.openxmlformats.org/drawingml/2006/main" xmlns:r="http://schemas.openxmlformats.org/officeDocument/2006/relationships" xmlns:p="http://schemas.openxmlformats.org/presentationml/2006/main">
   <p:cSld>
     <p:spTree>
@@ -17593,6 +17365,126 @@
 </p:sld>
 </file>
 
+<file path=ppt/slides/slide48.xml><?xml version="1.0" encoding="utf-8"?>
+<p:sld xmlns:a="http://schemas.openxmlformats.org/drawingml/2006/main" xmlns:r="http://schemas.openxmlformats.org/officeDocument/2006/relationships" xmlns:p="http://schemas.openxmlformats.org/presentationml/2006/main">
+  <p:cSld>
+    <p:spTree>
+      <p:nvGrpSpPr>
+        <p:cNvPr id="1" name=""/>
+        <p:cNvGrpSpPr/>
+        <p:nvPr/>
+      </p:nvGrpSpPr>
+      <p:grpSpPr>
+        <a:xfrm>
+          <a:off x="0" y="0"/>
+          <a:ext cx="0" cy="0"/>
+          <a:chOff x="0" y="0"/>
+          <a:chExt cx="0" cy="0"/>
+        </a:xfrm>
+      </p:grpSpPr>
+      <p:sp>
+        <p:nvSpPr>
+          <p:cNvPr id="2" name="标题 1">
+            <a:extLst>
+              <a:ext uri="{FF2B5EF4-FFF2-40B4-BE49-F238E27FC236}">
+                <a16:creationId xmlns:a16="http://schemas.microsoft.com/office/drawing/2014/main" id="{21F688EE-60F0-4B57-A4C1-5A84DC44634B}"/>
+              </a:ext>
+            </a:extLst>
+          </p:cNvPr>
+          <p:cNvSpPr>
+            <a:spLocks noGrp="1"/>
+          </p:cNvSpPr>
+          <p:nvPr>
+            <p:ph type="title"/>
+          </p:nvPr>
+        </p:nvSpPr>
+        <p:spPr/>
+        <p:txBody>
+          <a:bodyPr/>
+          <a:lstStyle/>
+          <a:p>
+            <a:r>
+              <a:rPr lang="en-US" altLang="zh-CN" dirty="0"/>
+              <a:t>Skinny-128</a:t>
+            </a:r>
+            <a:endParaRPr lang="zh-CN" altLang="en-US" dirty="0"/>
+          </a:p>
+        </p:txBody>
+      </p:sp>
+      <p:sp>
+        <p:nvSpPr>
+          <p:cNvPr id="3" name="内容占位符 2">
+            <a:extLst>
+              <a:ext uri="{FF2B5EF4-FFF2-40B4-BE49-F238E27FC236}">
+                <a16:creationId xmlns:a16="http://schemas.microsoft.com/office/drawing/2014/main" id="{1D0A6422-A0B0-4E66-BDF7-EA922E0D07AB}"/>
+              </a:ext>
+            </a:extLst>
+          </p:cNvPr>
+          <p:cNvSpPr>
+            <a:spLocks noGrp="1"/>
+          </p:cNvSpPr>
+          <p:nvPr>
+            <p:ph idx="1"/>
+          </p:nvPr>
+        </p:nvSpPr>
+        <p:spPr/>
+        <p:txBody>
+          <a:bodyPr/>
+          <a:lstStyle/>
+          <a:p>
+            <a:r>
+              <a:rPr lang="en-US" altLang="zh-CN" dirty="0">
+                <a:hlinkClick r:id="rId2" action="ppaction://hlinkfile"/>
+              </a:rPr>
+              <a:t>Security Analysis of SKINNY under Related-</a:t>
+            </a:r>
+            <a:r>
+              <a:rPr lang="en-US" altLang="zh-CN" dirty="0" err="1">
+                <a:hlinkClick r:id="rId2" action="ppaction://hlinkfile"/>
+              </a:rPr>
+              <a:t>Tweakey</a:t>
+            </a:r>
+            <a:r>
+              <a:rPr lang="en-US" altLang="zh-CN" dirty="0">
+                <a:hlinkClick r:id="rId2" action="ppaction://hlinkfile"/>
+              </a:rPr>
+              <a:t> Settings</a:t>
+            </a:r>
+            <a:endParaRPr lang="en-US" altLang="zh-CN" dirty="0"/>
+          </a:p>
+          <a:p>
+            <a:r>
+              <a:rPr lang="en-US" altLang="zh-CN" dirty="0">
+                <a:hlinkClick r:id="rId3" action="ppaction://hlinkfile"/>
+              </a:rPr>
+              <a:t>Cryptanalysis of Reduced round SKINNY Block Cipher</a:t>
+            </a:r>
+            <a:endParaRPr lang="zh-CN" altLang="en-US" dirty="0"/>
+          </a:p>
+          <a:p>
+            <a:r>
+              <a:rPr lang="en-US" altLang="zh-CN" dirty="0">
+                <a:hlinkClick r:id="rId4" action="ppaction://hlinkfile"/>
+              </a:rPr>
+              <a:t>Generalized Related-Key Rectangle Attacks on Block Ciphers with Linear Key Schedule</a:t>
+            </a:r>
+            <a:endParaRPr lang="zh-CN" altLang="en-US" dirty="0"/>
+          </a:p>
+        </p:txBody>
+      </p:sp>
+    </p:spTree>
+    <p:extLst>
+      <p:ext uri="{BB962C8B-B14F-4D97-AF65-F5344CB8AC3E}">
+        <p14:creationId xmlns:p14="http://schemas.microsoft.com/office/powerpoint/2010/main" val="395245439"/>
+      </p:ext>
+    </p:extLst>
+  </p:cSld>
+  <p:clrMapOvr>
+    <a:masterClrMapping/>
+  </p:clrMapOvr>
+</p:sld>
+</file>
+
 <file path=ppt/slides/slide49.xml><?xml version="1.0" encoding="utf-8"?>
 <p:sld xmlns:a="http://schemas.openxmlformats.org/drawingml/2006/main" xmlns:r="http://schemas.openxmlformats.org/officeDocument/2006/relationships" xmlns:p="http://schemas.openxmlformats.org/presentationml/2006/main">
   <p:cSld>
@@ -17615,7 +17507,7 @@
           <p:cNvPr id="2" name="标题 1">
             <a:extLst>
               <a:ext uri="{FF2B5EF4-FFF2-40B4-BE49-F238E27FC236}">
-                <a16:creationId xmlns:a16="http://schemas.microsoft.com/office/drawing/2014/main" id="{21F688EE-60F0-4B57-A4C1-5A84DC44634B}"/>
+                <a16:creationId xmlns:a16="http://schemas.microsoft.com/office/drawing/2014/main" id="{7D07A4E6-A302-43D2-8AC4-D3F4B006BD9E}"/>
               </a:ext>
             </a:extLst>
           </p:cNvPr>
@@ -17633,7 +17525,7 @@
           <a:p>
             <a:r>
               <a:rPr lang="en-US" altLang="zh-CN" dirty="0"/>
-              <a:t>Skinny-128</a:t>
+              <a:t>SPARKLE</a:t>
             </a:r>
             <a:endParaRPr lang="zh-CN" altLang="en-US" dirty="0"/>
           </a:p>
@@ -17644,7 +17536,7 @@
           <p:cNvPr id="3" name="内容占位符 2">
             <a:extLst>
               <a:ext uri="{FF2B5EF4-FFF2-40B4-BE49-F238E27FC236}">
-                <a16:creationId xmlns:a16="http://schemas.microsoft.com/office/drawing/2014/main" id="{1D0A6422-A0B0-4E66-BDF7-EA922E0D07AB}"/>
+                <a16:creationId xmlns:a16="http://schemas.microsoft.com/office/drawing/2014/main" id="{9F2A775B-FFF2-44E8-9921-7D4BE7CB5F1C}"/>
               </a:ext>
             </a:extLst>
           </p:cNvPr>
@@ -17655,55 +17547,212 @@
             <p:ph idx="1"/>
           </p:nvPr>
         </p:nvSpPr>
-        <p:spPr/>
-        <p:txBody>
-          <a:bodyPr/>
+        <p:spPr>
+          <a:xfrm>
+            <a:off x="838200" y="1825624"/>
+            <a:ext cx="10515600" cy="4844339"/>
+          </a:xfrm>
+        </p:spPr>
+        <p:txBody>
+          <a:bodyPr>
+            <a:normAutofit lnSpcReduction="10000"/>
+          </a:bodyPr>
           <a:lstStyle/>
           <a:p>
             <a:r>
-              <a:rPr lang="en-US" altLang="zh-CN" dirty="0">
-                <a:hlinkClick r:id="rId2" action="ppaction://hlinkfile"/>
-              </a:rPr>
-              <a:t>Security Analysis of SKINNY under Related-</a:t>
-            </a:r>
-            <a:r>
-              <a:rPr lang="en-US" altLang="zh-CN" dirty="0" err="1">
-                <a:hlinkClick r:id="rId2" action="ppaction://hlinkfile"/>
-              </a:rPr>
-              <a:t>Tweakey</a:t>
-            </a:r>
-            <a:r>
-              <a:rPr lang="en-US" altLang="zh-CN" dirty="0">
-                <a:hlinkClick r:id="rId2" action="ppaction://hlinkfile"/>
-              </a:rPr>
-              <a:t> Settings</a:t>
+              <a:rPr lang="zh-CN" altLang="en-US" dirty="0"/>
+              <a:t>对置换</a:t>
             </a:r>
             <a:endParaRPr lang="en-US" altLang="zh-CN" dirty="0"/>
           </a:p>
           <a:p>
-            <a:r>
-              <a:rPr lang="en-US" altLang="zh-CN" dirty="0">
-                <a:hlinkClick r:id="rId3" action="ppaction://hlinkfile"/>
-              </a:rPr>
-              <a:t>Cryptanalysis of Reduced round SKINNY Block Cipher</a:t>
-            </a:r>
-            <a:endParaRPr lang="zh-CN" altLang="en-US" dirty="0"/>
-          </a:p>
-          <a:p>
-            <a:r>
-              <a:rPr lang="en-US" altLang="zh-CN" dirty="0">
-                <a:hlinkClick r:id="rId4" action="ppaction://hlinkfile"/>
-              </a:rPr>
-              <a:t>Generalized Related-Key Rectangle Attacks on Block Ciphers with Linear Key Schedule</a:t>
-            </a:r>
-            <a:endParaRPr lang="zh-CN" altLang="en-US" dirty="0"/>
+            <a:pPr lvl="1"/>
+            <a:r>
+              <a:rPr lang="zh-CN" altLang="en-US" dirty="0"/>
+              <a:t>差分</a:t>
+            </a:r>
+            <a:r>
+              <a:rPr lang="en-US" altLang="zh-CN" dirty="0"/>
+              <a:t>/</a:t>
+            </a:r>
+            <a:r>
+              <a:rPr lang="zh-CN" altLang="en-US" dirty="0"/>
+              <a:t>线性，截断差分</a:t>
+            </a:r>
+            <a:endParaRPr lang="en-US" altLang="zh-CN" dirty="0"/>
+          </a:p>
+          <a:p>
+            <a:pPr lvl="1"/>
+            <a:r>
+              <a:rPr lang="zh-CN" altLang="en-US" dirty="0"/>
+              <a:t>飞去来器</a:t>
+            </a:r>
+            <a:endParaRPr lang="en-US" altLang="zh-CN" dirty="0"/>
+          </a:p>
+          <a:p>
+            <a:pPr lvl="1"/>
+            <a:r>
+              <a:rPr lang="en-US" altLang="zh-CN" dirty="0"/>
+              <a:t>Yoyo</a:t>
+            </a:r>
+          </a:p>
+          <a:p>
+            <a:pPr lvl="1"/>
+            <a:r>
+              <a:rPr lang="zh-CN" altLang="en-US" dirty="0"/>
+              <a:t>不可能差分、零相关</a:t>
+            </a:r>
+            <a:endParaRPr lang="en-US" altLang="zh-CN" dirty="0"/>
+          </a:p>
+          <a:p>
+            <a:pPr lvl="1"/>
+            <a:r>
+              <a:rPr lang="zh-CN" altLang="en-US" dirty="0"/>
+              <a:t>积分、可分性</a:t>
+            </a:r>
+            <a:endParaRPr lang="en-US" altLang="zh-CN" dirty="0"/>
+          </a:p>
+          <a:p>
+            <a:pPr lvl="1"/>
+            <a:r>
+              <a:rPr lang="zh-CN" altLang="en-US" dirty="0"/>
+              <a:t>滑动、旋转</a:t>
+            </a:r>
+            <a:endParaRPr lang="en-US" altLang="zh-CN" dirty="0"/>
+          </a:p>
+          <a:p>
+            <a:pPr lvl="1"/>
+            <a:r>
+              <a:rPr lang="zh-CN" altLang="en-US" dirty="0"/>
+              <a:t>不变子空间、非线性不变量</a:t>
+            </a:r>
+            <a:endParaRPr lang="en-US" altLang="zh-CN" dirty="0"/>
+          </a:p>
+          <a:p>
+            <a:r>
+              <a:rPr lang="zh-CN" altLang="en-US" dirty="0"/>
+              <a:t>对</a:t>
+            </a:r>
+            <a:r>
+              <a:rPr lang="en-US" altLang="zh-CN" dirty="0"/>
+              <a:t>Sponge</a:t>
+            </a:r>
+          </a:p>
+          <a:p>
+            <a:pPr lvl="1"/>
+            <a:r>
+              <a:rPr lang="zh-CN" altLang="en-US" dirty="0"/>
+              <a:t>差分</a:t>
+            </a:r>
+            <a:r>
+              <a:rPr lang="en-US" altLang="zh-CN" dirty="0"/>
+              <a:t>/</a:t>
+            </a:r>
+            <a:r>
+              <a:rPr lang="zh-CN" altLang="en-US" dirty="0"/>
+              <a:t>线性</a:t>
+            </a:r>
+            <a:endParaRPr lang="en-US" altLang="zh-CN" dirty="0"/>
+          </a:p>
+          <a:p>
+            <a:pPr lvl="1"/>
+            <a:r>
+              <a:rPr lang="zh-CN" altLang="en-US" dirty="0"/>
+              <a:t>不可能差分、零相关</a:t>
+            </a:r>
+            <a:endParaRPr lang="en-US" altLang="zh-CN" dirty="0"/>
+          </a:p>
+          <a:p>
+            <a:pPr lvl="1"/>
+            <a:r>
+              <a:rPr lang="zh-CN" altLang="en-US" dirty="0"/>
+              <a:t>猜测确定</a:t>
+            </a:r>
+            <a:endParaRPr lang="en-US" altLang="zh-CN" dirty="0"/>
+          </a:p>
+        </p:txBody>
+      </p:sp>
+      <p:pic>
+        <p:nvPicPr>
+          <p:cNvPr id="5" name="图片 4">
+            <a:extLst>
+              <a:ext uri="{FF2B5EF4-FFF2-40B4-BE49-F238E27FC236}">
+                <a16:creationId xmlns:a16="http://schemas.microsoft.com/office/drawing/2014/main" id="{6944CD0E-1026-4214-8F6C-5B01E9EEA88D}"/>
+              </a:ext>
+            </a:extLst>
+          </p:cNvPr>
+          <p:cNvPicPr>
+            <a:picLocks noChangeAspect="1"/>
+          </p:cNvPicPr>
+          <p:nvPr/>
+        </p:nvPicPr>
+        <p:blipFill>
+          <a:blip r:embed="rId2"/>
+          <a:stretch>
+            <a:fillRect/>
+          </a:stretch>
+        </p:blipFill>
+        <p:spPr>
+          <a:xfrm>
+            <a:off x="4680764" y="606047"/>
+            <a:ext cx="7319270" cy="2686821"/>
+          </a:xfrm>
+          <a:prstGeom prst="rect">
+            <a:avLst/>
+          </a:prstGeom>
+        </p:spPr>
+      </p:pic>
+      <p:sp>
+        <p:nvSpPr>
+          <p:cNvPr id="6" name="动作按钮: 第一张 4">
+            <a:hlinkClick r:id="rId3" action="ppaction://hlinksldjump" highlightClick="1"/>
+            <a:extLst>
+              <a:ext uri="{FF2B5EF4-FFF2-40B4-BE49-F238E27FC236}">
+                <a16:creationId xmlns:a16="http://schemas.microsoft.com/office/drawing/2014/main" id="{C346FFDE-2A29-4C7E-A527-3C13494BD28A}"/>
+              </a:ext>
+            </a:extLst>
+          </p:cNvPr>
+          <p:cNvSpPr/>
+          <p:nvPr/>
+        </p:nvSpPr>
+        <p:spPr>
+          <a:xfrm>
+            <a:off x="11808069" y="6541477"/>
+            <a:ext cx="383931" cy="316523"/>
+          </a:xfrm>
+          <a:prstGeom prst="actionButtonHome">
+            <a:avLst/>
+          </a:prstGeom>
+        </p:spPr>
+        <p:style>
+          <a:lnRef idx="2">
+            <a:schemeClr val="accent1">
+              <a:shade val="50000"/>
+            </a:schemeClr>
+          </a:lnRef>
+          <a:fillRef idx="1">
+            <a:schemeClr val="accent1"/>
+          </a:fillRef>
+          <a:effectRef idx="0">
+            <a:schemeClr val="accent1"/>
+          </a:effectRef>
+          <a:fontRef idx="minor">
+            <a:schemeClr val="lt1"/>
+          </a:fontRef>
+        </p:style>
+        <p:txBody>
+          <a:bodyPr rtlCol="0" anchor="ctr"/>
+          <a:lstStyle/>
+          <a:p>
+            <a:pPr algn="ctr"/>
+            <a:endParaRPr lang="zh-CN" altLang="en-US"/>
           </a:p>
         </p:txBody>
       </p:sp>
     </p:spTree>
     <p:extLst>
       <p:ext uri="{BB962C8B-B14F-4D97-AF65-F5344CB8AC3E}">
-        <p14:creationId xmlns:p14="http://schemas.microsoft.com/office/powerpoint/2010/main" val="395245439"/>
+        <p14:creationId xmlns:p14="http://schemas.microsoft.com/office/powerpoint/2010/main" val="2958668812"/>
       </p:ext>
     </p:extLst>
   </p:cSld>
@@ -17859,283 +17908,6 @@
           <p:cNvPr id="2" name="标题 1">
             <a:extLst>
               <a:ext uri="{FF2B5EF4-FFF2-40B4-BE49-F238E27FC236}">
-                <a16:creationId xmlns:a16="http://schemas.microsoft.com/office/drawing/2014/main" id="{7D07A4E6-A302-43D2-8AC4-D3F4B006BD9E}"/>
-              </a:ext>
-            </a:extLst>
-          </p:cNvPr>
-          <p:cNvSpPr>
-            <a:spLocks noGrp="1"/>
-          </p:cNvSpPr>
-          <p:nvPr>
-            <p:ph type="title"/>
-          </p:nvPr>
-        </p:nvSpPr>
-        <p:spPr/>
-        <p:txBody>
-          <a:bodyPr/>
-          <a:lstStyle/>
-          <a:p>
-            <a:r>
-              <a:rPr lang="en-US" altLang="zh-CN" dirty="0"/>
-              <a:t>SPARKLE</a:t>
-            </a:r>
-            <a:endParaRPr lang="zh-CN" altLang="en-US" dirty="0"/>
-          </a:p>
-        </p:txBody>
-      </p:sp>
-      <p:sp>
-        <p:nvSpPr>
-          <p:cNvPr id="3" name="内容占位符 2">
-            <a:extLst>
-              <a:ext uri="{FF2B5EF4-FFF2-40B4-BE49-F238E27FC236}">
-                <a16:creationId xmlns:a16="http://schemas.microsoft.com/office/drawing/2014/main" id="{9F2A775B-FFF2-44E8-9921-7D4BE7CB5F1C}"/>
-              </a:ext>
-            </a:extLst>
-          </p:cNvPr>
-          <p:cNvSpPr>
-            <a:spLocks noGrp="1"/>
-          </p:cNvSpPr>
-          <p:nvPr>
-            <p:ph idx="1"/>
-          </p:nvPr>
-        </p:nvSpPr>
-        <p:spPr>
-          <a:xfrm>
-            <a:off x="838200" y="1825624"/>
-            <a:ext cx="10515600" cy="4844339"/>
-          </a:xfrm>
-        </p:spPr>
-        <p:txBody>
-          <a:bodyPr>
-            <a:normAutofit lnSpcReduction="10000"/>
-          </a:bodyPr>
-          <a:lstStyle/>
-          <a:p>
-            <a:r>
-              <a:rPr lang="zh-CN" altLang="en-US" dirty="0"/>
-              <a:t>对置换</a:t>
-            </a:r>
-            <a:endParaRPr lang="en-US" altLang="zh-CN" dirty="0"/>
-          </a:p>
-          <a:p>
-            <a:pPr lvl="1"/>
-            <a:r>
-              <a:rPr lang="zh-CN" altLang="en-US" dirty="0"/>
-              <a:t>差分</a:t>
-            </a:r>
-            <a:r>
-              <a:rPr lang="en-US" altLang="zh-CN" dirty="0"/>
-              <a:t>/</a:t>
-            </a:r>
-            <a:r>
-              <a:rPr lang="zh-CN" altLang="en-US" dirty="0"/>
-              <a:t>线性，截断差分</a:t>
-            </a:r>
-            <a:endParaRPr lang="en-US" altLang="zh-CN" dirty="0"/>
-          </a:p>
-          <a:p>
-            <a:pPr lvl="1"/>
-            <a:r>
-              <a:rPr lang="zh-CN" altLang="en-US" dirty="0"/>
-              <a:t>飞去来器</a:t>
-            </a:r>
-            <a:endParaRPr lang="en-US" altLang="zh-CN" dirty="0"/>
-          </a:p>
-          <a:p>
-            <a:pPr lvl="1"/>
-            <a:r>
-              <a:rPr lang="en-US" altLang="zh-CN" dirty="0"/>
-              <a:t>Yoyo</a:t>
-            </a:r>
-          </a:p>
-          <a:p>
-            <a:pPr lvl="1"/>
-            <a:r>
-              <a:rPr lang="zh-CN" altLang="en-US" dirty="0"/>
-              <a:t>不可能差分、零相关</a:t>
-            </a:r>
-            <a:endParaRPr lang="en-US" altLang="zh-CN" dirty="0"/>
-          </a:p>
-          <a:p>
-            <a:pPr lvl="1"/>
-            <a:r>
-              <a:rPr lang="zh-CN" altLang="en-US" dirty="0"/>
-              <a:t>积分、可分性</a:t>
-            </a:r>
-            <a:endParaRPr lang="en-US" altLang="zh-CN" dirty="0"/>
-          </a:p>
-          <a:p>
-            <a:pPr lvl="1"/>
-            <a:r>
-              <a:rPr lang="zh-CN" altLang="en-US" dirty="0"/>
-              <a:t>滑动、旋转</a:t>
-            </a:r>
-            <a:endParaRPr lang="en-US" altLang="zh-CN" dirty="0"/>
-          </a:p>
-          <a:p>
-            <a:pPr lvl="1"/>
-            <a:r>
-              <a:rPr lang="zh-CN" altLang="en-US" dirty="0"/>
-              <a:t>不变子空间、非线性不变量</a:t>
-            </a:r>
-            <a:endParaRPr lang="en-US" altLang="zh-CN" dirty="0"/>
-          </a:p>
-          <a:p>
-            <a:r>
-              <a:rPr lang="zh-CN" altLang="en-US" dirty="0"/>
-              <a:t>对</a:t>
-            </a:r>
-            <a:r>
-              <a:rPr lang="en-US" altLang="zh-CN" dirty="0"/>
-              <a:t>Sponge</a:t>
-            </a:r>
-          </a:p>
-          <a:p>
-            <a:pPr lvl="1"/>
-            <a:r>
-              <a:rPr lang="zh-CN" altLang="en-US" dirty="0"/>
-              <a:t>差分</a:t>
-            </a:r>
-            <a:r>
-              <a:rPr lang="en-US" altLang="zh-CN" dirty="0"/>
-              <a:t>/</a:t>
-            </a:r>
-            <a:r>
-              <a:rPr lang="zh-CN" altLang="en-US" dirty="0"/>
-              <a:t>线性</a:t>
-            </a:r>
-            <a:endParaRPr lang="en-US" altLang="zh-CN" dirty="0"/>
-          </a:p>
-          <a:p>
-            <a:pPr lvl="1"/>
-            <a:r>
-              <a:rPr lang="zh-CN" altLang="en-US" dirty="0"/>
-              <a:t>不可能差分、零相关</a:t>
-            </a:r>
-            <a:endParaRPr lang="en-US" altLang="zh-CN" dirty="0"/>
-          </a:p>
-          <a:p>
-            <a:pPr lvl="1"/>
-            <a:r>
-              <a:rPr lang="zh-CN" altLang="en-US" dirty="0"/>
-              <a:t>猜测确定</a:t>
-            </a:r>
-            <a:endParaRPr lang="en-US" altLang="zh-CN" dirty="0"/>
-          </a:p>
-        </p:txBody>
-      </p:sp>
-      <p:pic>
-        <p:nvPicPr>
-          <p:cNvPr id="5" name="图片 4">
-            <a:extLst>
-              <a:ext uri="{FF2B5EF4-FFF2-40B4-BE49-F238E27FC236}">
-                <a16:creationId xmlns:a16="http://schemas.microsoft.com/office/drawing/2014/main" id="{6944CD0E-1026-4214-8F6C-5B01E9EEA88D}"/>
-              </a:ext>
-            </a:extLst>
-          </p:cNvPr>
-          <p:cNvPicPr>
-            <a:picLocks noChangeAspect="1"/>
-          </p:cNvPicPr>
-          <p:nvPr/>
-        </p:nvPicPr>
-        <p:blipFill>
-          <a:blip r:embed="rId2"/>
-          <a:stretch>
-            <a:fillRect/>
-          </a:stretch>
-        </p:blipFill>
-        <p:spPr>
-          <a:xfrm>
-            <a:off x="4680764" y="606047"/>
-            <a:ext cx="7319270" cy="2686821"/>
-          </a:xfrm>
-          <a:prstGeom prst="rect">
-            <a:avLst/>
-          </a:prstGeom>
-        </p:spPr>
-      </p:pic>
-      <p:sp>
-        <p:nvSpPr>
-          <p:cNvPr id="6" name="动作按钮: 第一张 4">
-            <a:hlinkClick r:id="rId3" action="ppaction://hlinksldjump" highlightClick="1"/>
-            <a:extLst>
-              <a:ext uri="{FF2B5EF4-FFF2-40B4-BE49-F238E27FC236}">
-                <a16:creationId xmlns:a16="http://schemas.microsoft.com/office/drawing/2014/main" id="{C346FFDE-2A29-4C7E-A527-3C13494BD28A}"/>
-              </a:ext>
-            </a:extLst>
-          </p:cNvPr>
-          <p:cNvSpPr/>
-          <p:nvPr/>
-        </p:nvSpPr>
-        <p:spPr>
-          <a:xfrm>
-            <a:off x="11808069" y="6541477"/>
-            <a:ext cx="383931" cy="316523"/>
-          </a:xfrm>
-          <a:prstGeom prst="actionButtonHome">
-            <a:avLst/>
-          </a:prstGeom>
-        </p:spPr>
-        <p:style>
-          <a:lnRef idx="2">
-            <a:schemeClr val="accent1">
-              <a:shade val="50000"/>
-            </a:schemeClr>
-          </a:lnRef>
-          <a:fillRef idx="1">
-            <a:schemeClr val="accent1"/>
-          </a:fillRef>
-          <a:effectRef idx="0">
-            <a:schemeClr val="accent1"/>
-          </a:effectRef>
-          <a:fontRef idx="minor">
-            <a:schemeClr val="lt1"/>
-          </a:fontRef>
-        </p:style>
-        <p:txBody>
-          <a:bodyPr rtlCol="0" anchor="ctr"/>
-          <a:lstStyle/>
-          <a:p>
-            <a:pPr algn="ctr"/>
-            <a:endParaRPr lang="zh-CN" altLang="en-US"/>
-          </a:p>
-        </p:txBody>
-      </p:sp>
-    </p:spTree>
-    <p:extLst>
-      <p:ext uri="{BB962C8B-B14F-4D97-AF65-F5344CB8AC3E}">
-        <p14:creationId xmlns:p14="http://schemas.microsoft.com/office/powerpoint/2010/main" val="2958668812"/>
-      </p:ext>
-    </p:extLst>
-  </p:cSld>
-  <p:clrMapOvr>
-    <a:masterClrMapping/>
-  </p:clrMapOvr>
-</p:sld>
-</file>
-
-<file path=ppt/slides/slide51.xml><?xml version="1.0" encoding="utf-8"?>
-<p:sld xmlns:a="http://schemas.openxmlformats.org/drawingml/2006/main" xmlns:r="http://schemas.openxmlformats.org/officeDocument/2006/relationships" xmlns:p="http://schemas.openxmlformats.org/presentationml/2006/main">
-  <p:cSld>
-    <p:spTree>
-      <p:nvGrpSpPr>
-        <p:cNvPr id="1" name=""/>
-        <p:cNvGrpSpPr/>
-        <p:nvPr/>
-      </p:nvGrpSpPr>
-      <p:grpSpPr>
-        <a:xfrm>
-          <a:off x="0" y="0"/>
-          <a:ext cx="0" cy="0"/>
-          <a:chOff x="0" y="0"/>
-          <a:chExt cx="0" cy="0"/>
-        </a:xfrm>
-      </p:grpSpPr>
-      <p:sp>
-        <p:nvSpPr>
-          <p:cNvPr id="2" name="标题 1">
-            <a:extLst>
-              <a:ext uri="{FF2B5EF4-FFF2-40B4-BE49-F238E27FC236}">
                 <a16:creationId xmlns:a16="http://schemas.microsoft.com/office/drawing/2014/main" id="{77546A2C-0F20-4624-8C42-4E08716C206E}"/>
               </a:ext>
             </a:extLst>
@@ -18330,7 +18102,7 @@
 </p:sld>
 </file>
 
-<file path=ppt/slides/slide52.xml><?xml version="1.0" encoding="utf-8"?>
+<file path=ppt/slides/slide51.xml><?xml version="1.0" encoding="utf-8"?>
 <p:sld xmlns:a="http://schemas.openxmlformats.org/drawingml/2006/main" xmlns:r="http://schemas.openxmlformats.org/officeDocument/2006/relationships" xmlns:p="http://schemas.openxmlformats.org/presentationml/2006/main">
   <p:cSld>
     <p:spTree>
@@ -18577,7 +18349,7 @@
 </p:sld>
 </file>
 
-<file path=ppt/slides/slide53.xml><?xml version="1.0" encoding="utf-8"?>
+<file path=ppt/slides/slide52.xml><?xml version="1.0" encoding="utf-8"?>
 <p:sld xmlns:a="http://schemas.openxmlformats.org/drawingml/2006/main" xmlns:r="http://schemas.openxmlformats.org/officeDocument/2006/relationships" xmlns:p="http://schemas.openxmlformats.org/presentationml/2006/main">
   <p:cSld>
     <p:spTree>
@@ -18827,7 +18599,920 @@
 </p:sld>
 </file>
 
+<file path=ppt/slides/slide53.xml><?xml version="1.0" encoding="utf-8"?>
+<p:sld xmlns:a="http://schemas.openxmlformats.org/drawingml/2006/main" xmlns:r="http://schemas.openxmlformats.org/officeDocument/2006/relationships" xmlns:p="http://schemas.openxmlformats.org/presentationml/2006/main">
+  <p:cSld>
+    <p:bg>
+      <p:bgPr>
+        <a:solidFill>
+          <a:srgbClr val="5B9BD5"/>
+        </a:solidFill>
+        <a:effectLst/>
+      </p:bgPr>
+    </p:bg>
+    <p:spTree>
+      <p:nvGrpSpPr>
+        <p:cNvPr id="1" name=""/>
+        <p:cNvGrpSpPr/>
+        <p:nvPr/>
+      </p:nvGrpSpPr>
+      <p:grpSpPr>
+        <a:xfrm>
+          <a:off x="0" y="0"/>
+          <a:ext cx="0" cy="0"/>
+          <a:chOff x="0" y="0"/>
+          <a:chExt cx="0" cy="0"/>
+        </a:xfrm>
+      </p:grpSpPr>
+      <p:sp>
+        <p:nvSpPr>
+          <p:cNvPr id="2" name="标题 1"/>
+          <p:cNvSpPr>
+            <a:spLocks noGrp="1"/>
+          </p:cNvSpPr>
+          <p:nvPr>
+            <p:ph type="title"/>
+          </p:nvPr>
+        </p:nvSpPr>
+        <p:spPr/>
+        <p:txBody>
+          <a:bodyPr/>
+          <a:lstStyle/>
+          <a:p>
+            <a:r>
+              <a:rPr lang="en-US" altLang="zh-CN" dirty="0"/>
+              <a:t>Cryptanalysis</a:t>
+            </a:r>
+            <a:endParaRPr lang="zh-CN" altLang="en-US" dirty="0"/>
+          </a:p>
+        </p:txBody>
+      </p:sp>
+      <p:sp>
+        <p:nvSpPr>
+          <p:cNvPr id="4" name="文本占位符 3">
+            <a:extLst>
+              <a:ext uri="{FF2B5EF4-FFF2-40B4-BE49-F238E27FC236}">
+                <a16:creationId xmlns:a16="http://schemas.microsoft.com/office/drawing/2014/main" id="{012580ED-454D-4CFA-93F8-BC9897503E48}"/>
+              </a:ext>
+            </a:extLst>
+          </p:cNvPr>
+          <p:cNvSpPr>
+            <a:spLocks noGrp="1"/>
+          </p:cNvSpPr>
+          <p:nvPr>
+            <p:ph type="body" idx="1"/>
+          </p:nvPr>
+        </p:nvSpPr>
+        <p:spPr/>
+        <p:txBody>
+          <a:bodyPr/>
+          <a:lstStyle/>
+          <a:p>
+            <a:r>
+              <a:rPr lang="en-US" altLang="zh-CN" dirty="0">
+                <a:solidFill>
+                  <a:schemeClr val="accent2">
+                    <a:lumMod val="75000"/>
+                  </a:schemeClr>
+                </a:solidFill>
+              </a:rPr>
+              <a:t>Grouped by cryptanalysis</a:t>
+            </a:r>
+            <a:endParaRPr lang="zh-CN" altLang="en-US" dirty="0">
+              <a:solidFill>
+                <a:schemeClr val="accent2">
+                  <a:lumMod val="75000"/>
+                </a:schemeClr>
+              </a:solidFill>
+            </a:endParaRPr>
+          </a:p>
+        </p:txBody>
+      </p:sp>
+    </p:spTree>
+    <p:extLst>
+      <p:ext uri="{BB962C8B-B14F-4D97-AF65-F5344CB8AC3E}">
+        <p14:creationId xmlns:p14="http://schemas.microsoft.com/office/powerpoint/2010/main" val="732011847"/>
+      </p:ext>
+    </p:extLst>
+  </p:cSld>
+  <p:clrMapOvr>
+    <a:masterClrMapping/>
+  </p:clrMapOvr>
+</p:sld>
+</file>
+
 <file path=ppt/slides/slide54.xml><?xml version="1.0" encoding="utf-8"?>
+<p:sld xmlns:a="http://schemas.openxmlformats.org/drawingml/2006/main" xmlns:r="http://schemas.openxmlformats.org/officeDocument/2006/relationships" xmlns:p="http://schemas.openxmlformats.org/presentationml/2006/main">
+  <p:cSld>
+    <p:spTree>
+      <p:nvGrpSpPr>
+        <p:cNvPr id="1" name=""/>
+        <p:cNvGrpSpPr/>
+        <p:nvPr/>
+      </p:nvGrpSpPr>
+      <p:grpSpPr>
+        <a:xfrm>
+          <a:off x="0" y="0"/>
+          <a:ext cx="0" cy="0"/>
+          <a:chOff x="0" y="0"/>
+          <a:chExt cx="0" cy="0"/>
+        </a:xfrm>
+      </p:grpSpPr>
+      <p:sp>
+        <p:nvSpPr>
+          <p:cNvPr id="4" name="标题 3">
+            <a:extLst>
+              <a:ext uri="{FF2B5EF4-FFF2-40B4-BE49-F238E27FC236}">
+                <a16:creationId xmlns:a16="http://schemas.microsoft.com/office/drawing/2014/main" id="{9EB34DBD-CC34-4A35-842D-EBB0E45067C7}"/>
+              </a:ext>
+            </a:extLst>
+          </p:cNvPr>
+          <p:cNvSpPr>
+            <a:spLocks noGrp="1"/>
+          </p:cNvSpPr>
+          <p:nvPr>
+            <p:ph type="title"/>
+          </p:nvPr>
+        </p:nvSpPr>
+        <p:spPr/>
+        <p:txBody>
+          <a:bodyPr/>
+          <a:lstStyle/>
+          <a:p>
+            <a:r>
+              <a:rPr lang="zh-CN" altLang="en-US" dirty="0"/>
+              <a:t>差分</a:t>
+            </a:r>
+          </a:p>
+        </p:txBody>
+      </p:sp>
+      <p:sp>
+        <p:nvSpPr>
+          <p:cNvPr id="5" name="内容占位符 4">
+            <a:extLst>
+              <a:ext uri="{FF2B5EF4-FFF2-40B4-BE49-F238E27FC236}">
+                <a16:creationId xmlns:a16="http://schemas.microsoft.com/office/drawing/2014/main" id="{4A48A327-D3F4-4851-940C-7E8E7DD6C2FA}"/>
+              </a:ext>
+            </a:extLst>
+          </p:cNvPr>
+          <p:cNvSpPr>
+            <a:spLocks noGrp="1"/>
+          </p:cNvSpPr>
+          <p:nvPr>
+            <p:ph idx="1"/>
+          </p:nvPr>
+        </p:nvSpPr>
+        <p:spPr/>
+        <p:txBody>
+          <a:bodyPr/>
+          <a:lstStyle/>
+          <a:p>
+            <a:r>
+              <a:rPr lang="zh-CN" altLang="en-US" dirty="0"/>
+              <a:t>经典差分</a:t>
+            </a:r>
+            <a:endParaRPr lang="en-US" altLang="zh-CN" dirty="0"/>
+          </a:p>
+          <a:p>
+            <a:r>
+              <a:rPr lang="en-US" altLang="zh-CN" dirty="0"/>
+              <a:t>Internal Diff</a:t>
+            </a:r>
+          </a:p>
+          <a:p>
+            <a:r>
+              <a:rPr lang="en-US" altLang="zh-CN" dirty="0"/>
+              <a:t>Internal Boomerang</a:t>
+            </a:r>
+            <a:endParaRPr lang="zh-CN" altLang="en-US" dirty="0"/>
+          </a:p>
+        </p:txBody>
+      </p:sp>
+      <p:pic>
+        <p:nvPicPr>
+          <p:cNvPr id="7" name="图片 6">
+            <a:extLst>
+              <a:ext uri="{FF2B5EF4-FFF2-40B4-BE49-F238E27FC236}">
+                <a16:creationId xmlns:a16="http://schemas.microsoft.com/office/drawing/2014/main" id="{DD9C3F97-7E29-484F-BDD1-5445B9B13C66}"/>
+              </a:ext>
+            </a:extLst>
+          </p:cNvPr>
+          <p:cNvPicPr>
+            <a:picLocks noChangeAspect="1"/>
+          </p:cNvPicPr>
+          <p:nvPr/>
+        </p:nvPicPr>
+        <p:blipFill>
+          <a:blip r:embed="rId2"/>
+          <a:stretch>
+            <a:fillRect/>
+          </a:stretch>
+        </p:blipFill>
+        <p:spPr>
+          <a:xfrm>
+            <a:off x="6028158" y="1582510"/>
+            <a:ext cx="4819650" cy="2647950"/>
+          </a:xfrm>
+          <a:prstGeom prst="rect">
+            <a:avLst/>
+          </a:prstGeom>
+        </p:spPr>
+      </p:pic>
+    </p:spTree>
+    <p:extLst>
+      <p:ext uri="{BB962C8B-B14F-4D97-AF65-F5344CB8AC3E}">
+        <p14:creationId xmlns:p14="http://schemas.microsoft.com/office/powerpoint/2010/main" val="1763538672"/>
+      </p:ext>
+    </p:extLst>
+  </p:cSld>
+  <p:clrMapOvr>
+    <a:masterClrMapping/>
+  </p:clrMapOvr>
+</p:sld>
+</file>
+
+<file path=ppt/slides/slide55.xml><?xml version="1.0" encoding="utf-8"?>
+<p:sld xmlns:a="http://schemas.openxmlformats.org/drawingml/2006/main" xmlns:r="http://schemas.openxmlformats.org/officeDocument/2006/relationships" xmlns:p="http://schemas.openxmlformats.org/presentationml/2006/main">
+  <p:cSld>
+    <p:spTree>
+      <p:nvGrpSpPr>
+        <p:cNvPr id="1" name=""/>
+        <p:cNvGrpSpPr/>
+        <p:nvPr/>
+      </p:nvGrpSpPr>
+      <p:grpSpPr>
+        <a:xfrm>
+          <a:off x="0" y="0"/>
+          <a:ext cx="0" cy="0"/>
+          <a:chOff x="0" y="0"/>
+          <a:chExt cx="0" cy="0"/>
+        </a:xfrm>
+      </p:grpSpPr>
+      <p:sp>
+        <p:nvSpPr>
+          <p:cNvPr id="2" name="标题 1">
+            <a:extLst>
+              <a:ext uri="{FF2B5EF4-FFF2-40B4-BE49-F238E27FC236}">
+                <a16:creationId xmlns:a16="http://schemas.microsoft.com/office/drawing/2014/main" id="{C60B3654-41B4-434A-9AA4-7CAC4B6DC7BE}"/>
+              </a:ext>
+            </a:extLst>
+          </p:cNvPr>
+          <p:cNvSpPr>
+            <a:spLocks noGrp="1"/>
+          </p:cNvSpPr>
+          <p:nvPr>
+            <p:ph type="title"/>
+          </p:nvPr>
+        </p:nvSpPr>
+        <p:spPr/>
+        <p:txBody>
+          <a:bodyPr/>
+          <a:lstStyle/>
+          <a:p>
+            <a:r>
+              <a:rPr lang="en-US" altLang="zh-CN" dirty="0"/>
+              <a:t>Rebound</a:t>
+            </a:r>
+            <a:endParaRPr lang="zh-CN" altLang="en-US" dirty="0"/>
+          </a:p>
+        </p:txBody>
+      </p:sp>
+      <p:sp>
+        <p:nvSpPr>
+          <p:cNvPr id="3" name="内容占位符 2">
+            <a:extLst>
+              <a:ext uri="{FF2B5EF4-FFF2-40B4-BE49-F238E27FC236}">
+                <a16:creationId xmlns:a16="http://schemas.microsoft.com/office/drawing/2014/main" id="{CDF94E2E-47EA-43D0-9826-1BD61C997212}"/>
+              </a:ext>
+            </a:extLst>
+          </p:cNvPr>
+          <p:cNvSpPr>
+            <a:spLocks noGrp="1"/>
+          </p:cNvSpPr>
+          <p:nvPr>
+            <p:ph idx="1"/>
+          </p:nvPr>
+        </p:nvSpPr>
+        <p:spPr/>
+        <p:txBody>
+          <a:bodyPr>
+            <a:normAutofit fontScale="77500" lnSpcReduction="20000"/>
+          </a:bodyPr>
+          <a:lstStyle/>
+          <a:p>
+            <a:r>
+              <a:rPr lang="zh-CN" altLang="en-US" dirty="0"/>
+              <a:t>用截断差分找到</a:t>
+            </a:r>
+            <a:r>
+              <a:rPr lang="en-US" altLang="zh-CN" dirty="0"/>
+              <a:t>collision</a:t>
+            </a:r>
+            <a:r>
+              <a:rPr lang="zh-CN" altLang="en-US" dirty="0"/>
+              <a:t>的复杂度估计</a:t>
+            </a:r>
+            <a:endParaRPr lang="en-US" altLang="zh-CN" dirty="0">
+              <a:hlinkClick r:id="rId2" action="ppaction://hlinkfile"/>
+            </a:endParaRPr>
+          </a:p>
+          <a:p>
+            <a:r>
+              <a:rPr lang="en-US" altLang="zh-CN" dirty="0">
+                <a:hlinkClick r:id="rId2" action="ppaction://hlinkfile"/>
+              </a:rPr>
+              <a:t>The Rebound Attack: Cryptanalysis of Reduced Whirlpool and </a:t>
+            </a:r>
+            <a:r>
+              <a:rPr lang="en-US" altLang="zh-CN" dirty="0" err="1">
+                <a:hlinkClick r:id="rId2" action="ppaction://hlinkfile"/>
+              </a:rPr>
+              <a:t>Grøstl</a:t>
+            </a:r>
+            <a:endParaRPr lang="en-US" altLang="zh-CN" dirty="0"/>
+          </a:p>
+          <a:p>
+            <a:pPr lvl="1"/>
+            <a:r>
+              <a:rPr lang="en-US" altLang="zh-CN" dirty="0"/>
+              <a:t>09</a:t>
+            </a:r>
+            <a:r>
+              <a:rPr lang="zh-CN" altLang="en-US" dirty="0"/>
+              <a:t>年</a:t>
+            </a:r>
+            <a:r>
+              <a:rPr lang="en-US" altLang="zh-CN" dirty="0"/>
+              <a:t>Mendel</a:t>
+            </a:r>
+            <a:r>
+              <a:rPr lang="zh-CN" altLang="en-US" dirty="0"/>
+              <a:t>等提出</a:t>
+            </a:r>
+            <a:r>
+              <a:rPr lang="en-US" altLang="zh-CN" dirty="0"/>
+              <a:t>rebound</a:t>
+            </a:r>
+            <a:r>
+              <a:rPr lang="zh-CN" altLang="en-US" dirty="0"/>
+              <a:t>攻击，计算找到满足差分的一对值的复杂度</a:t>
+            </a:r>
+            <a:endParaRPr lang="en-US" altLang="zh-CN" dirty="0"/>
+          </a:p>
+          <a:p>
+            <a:pPr lvl="1"/>
+            <a:r>
+              <a:rPr lang="zh-CN" altLang="en-US" dirty="0"/>
+              <a:t>攻击了</a:t>
+            </a:r>
+            <a:r>
+              <a:rPr lang="en-US" altLang="zh-CN" dirty="0"/>
+              <a:t>7.5</a:t>
+            </a:r>
+            <a:r>
+              <a:rPr lang="zh-CN" altLang="en-US" dirty="0"/>
+              <a:t>轮</a:t>
+            </a:r>
+            <a:r>
+              <a:rPr lang="en-US" altLang="zh-CN" dirty="0"/>
+              <a:t>Whirlpool</a:t>
+            </a:r>
+            <a:r>
+              <a:rPr lang="zh-CN" altLang="en-US" dirty="0"/>
+              <a:t>，</a:t>
+            </a:r>
+            <a:r>
+              <a:rPr lang="en-US" altLang="zh-CN" dirty="0"/>
+              <a:t>8.5</a:t>
+            </a:r>
+            <a:r>
+              <a:rPr lang="zh-CN" altLang="en-US" dirty="0"/>
+              <a:t>轮</a:t>
+            </a:r>
+            <a:r>
+              <a:rPr lang="en-US" altLang="zh-CN" dirty="0"/>
+              <a:t>Maelstrom</a:t>
+            </a:r>
+            <a:r>
+              <a:rPr lang="zh-CN" altLang="en-US" dirty="0"/>
+              <a:t>，</a:t>
+            </a:r>
+            <a:r>
+              <a:rPr lang="en-US" altLang="zh-CN" dirty="0"/>
+              <a:t>6</a:t>
+            </a:r>
+            <a:r>
+              <a:rPr lang="zh-CN" altLang="en-US" dirty="0"/>
+              <a:t>轮</a:t>
+            </a:r>
+            <a:r>
+              <a:rPr lang="en-US" altLang="zh-CN" dirty="0"/>
+              <a:t>Grostl-256</a:t>
+            </a:r>
+          </a:p>
+          <a:p>
+            <a:r>
+              <a:rPr lang="en-US" altLang="zh-CN" dirty="0">
+                <a:hlinkClick r:id="rId3" action="ppaction://hlinkfile"/>
+              </a:rPr>
+              <a:t>Super-</a:t>
+            </a:r>
+            <a:r>
+              <a:rPr lang="en-US" altLang="zh-CN" dirty="0" err="1">
+                <a:hlinkClick r:id="rId3" action="ppaction://hlinkfile"/>
+              </a:rPr>
+              <a:t>Sbox</a:t>
+            </a:r>
+            <a:r>
+              <a:rPr lang="en-US" altLang="zh-CN" dirty="0">
+                <a:hlinkClick r:id="rId3" action="ppaction://hlinkfile"/>
+              </a:rPr>
+              <a:t> Cryptanalysis: Improved Attacks for AES-Like Permutations</a:t>
+            </a:r>
+            <a:endParaRPr lang="en-US" altLang="zh-CN" dirty="0"/>
+          </a:p>
+          <a:p>
+            <a:pPr lvl="1"/>
+            <a:r>
+              <a:rPr lang="zh-CN" altLang="en-US" dirty="0"/>
+              <a:t>将中间一轮全活跃扩展到中间两轮全活跃。将两个</a:t>
+            </a:r>
+            <a:r>
+              <a:rPr lang="en-US" altLang="zh-CN" dirty="0"/>
+              <a:t>SB</a:t>
+            </a:r>
+            <a:r>
+              <a:rPr lang="zh-CN" altLang="en-US" dirty="0"/>
+              <a:t>层看作一层，一列作为</a:t>
+            </a:r>
+            <a:r>
+              <a:rPr lang="en-US" altLang="zh-CN" dirty="0"/>
+              <a:t>Super-</a:t>
+            </a:r>
+            <a:r>
+              <a:rPr lang="en-US" altLang="zh-CN" dirty="0" err="1"/>
+              <a:t>Sbox</a:t>
+            </a:r>
+            <a:r>
+              <a:rPr lang="zh-CN" altLang="en-US" dirty="0"/>
+              <a:t>。</a:t>
+            </a:r>
+            <a:endParaRPr lang="en-US" altLang="zh-CN" dirty="0"/>
+          </a:p>
+          <a:p>
+            <a:r>
+              <a:rPr lang="en-US" altLang="zh-CN" dirty="0">
+                <a:hlinkClick r:id="rId4" action="ppaction://hlinkfile"/>
+              </a:rPr>
+              <a:t>Improved rebound attack on the finalist </a:t>
+            </a:r>
+            <a:r>
+              <a:rPr lang="en-US" altLang="zh-CN" dirty="0" err="1">
+                <a:hlinkClick r:id="rId4" action="ppaction://hlinkfile"/>
+              </a:rPr>
+              <a:t>grøstl</a:t>
+            </a:r>
+            <a:endParaRPr lang="en-US" altLang="zh-CN" dirty="0"/>
+          </a:p>
+          <a:p>
+            <a:pPr lvl="1"/>
+            <a:r>
+              <a:rPr lang="zh-CN" altLang="en-US" dirty="0"/>
+              <a:t>将中间两轮全活跃扩展到中间三轮全活跃</a:t>
+            </a:r>
+            <a:endParaRPr lang="en-US" altLang="zh-CN" dirty="0"/>
+          </a:p>
+          <a:p>
+            <a:pPr lvl="1"/>
+            <a:r>
+              <a:rPr lang="en-US" altLang="zh-CN" dirty="0"/>
+              <a:t>9</a:t>
+            </a:r>
+            <a:r>
+              <a:rPr lang="zh-CN" altLang="en-US" dirty="0"/>
+              <a:t>轮</a:t>
+            </a:r>
+            <a:r>
+              <a:rPr lang="en-US" altLang="zh-CN" dirty="0"/>
+              <a:t>Grostl-256</a:t>
+            </a:r>
+            <a:r>
+              <a:rPr lang="zh-CN" altLang="en-US" dirty="0"/>
+              <a:t>，</a:t>
+            </a:r>
+            <a:r>
+              <a:rPr lang="en-US" altLang="zh-CN" dirty="0"/>
+              <a:t>10</a:t>
+            </a:r>
+            <a:r>
+              <a:rPr lang="zh-CN" altLang="en-US" dirty="0"/>
+              <a:t>轮</a:t>
+            </a:r>
+            <a:r>
+              <a:rPr lang="en-US" altLang="zh-CN" dirty="0"/>
+              <a:t>Grostl-512</a:t>
+            </a:r>
+            <a:r>
+              <a:rPr lang="zh-CN" altLang="en-US" dirty="0"/>
+              <a:t>，</a:t>
+            </a:r>
+            <a:r>
+              <a:rPr lang="en-US" altLang="zh-CN" dirty="0"/>
+              <a:t>PHOTON-224/32/32</a:t>
+            </a:r>
+            <a:r>
+              <a:rPr lang="zh-CN" altLang="en-US" dirty="0"/>
+              <a:t>提高了</a:t>
+            </a:r>
+            <a:r>
+              <a:rPr lang="en-US" altLang="zh-CN" dirty="0"/>
+              <a:t>1</a:t>
+            </a:r>
+            <a:r>
+              <a:rPr lang="zh-CN" altLang="en-US" dirty="0"/>
+              <a:t>轮（从</a:t>
+            </a:r>
+            <a:r>
+              <a:rPr lang="en-US" altLang="zh-CN" dirty="0"/>
+              <a:t>8</a:t>
+            </a:r>
+            <a:r>
+              <a:rPr lang="zh-CN" altLang="en-US" dirty="0"/>
+              <a:t>到</a:t>
+            </a:r>
+            <a:r>
+              <a:rPr lang="en-US" altLang="zh-CN" dirty="0"/>
+              <a:t>9</a:t>
+            </a:r>
+            <a:r>
+              <a:rPr lang="zh-CN" altLang="en-US" dirty="0"/>
+              <a:t>）</a:t>
+            </a:r>
+            <a:endParaRPr lang="en-US" altLang="zh-CN" dirty="0"/>
+          </a:p>
+          <a:p>
+            <a:r>
+              <a:rPr lang="en-US" altLang="zh-CN" dirty="0">
+                <a:hlinkClick r:id="rId5" action="ppaction://hlinkfile"/>
+              </a:rPr>
+              <a:t>Non-full-active Super-</a:t>
+            </a:r>
+            <a:r>
+              <a:rPr lang="en-US" altLang="zh-CN" dirty="0" err="1">
+                <a:hlinkClick r:id="rId5" action="ppaction://hlinkfile"/>
+              </a:rPr>
+              <a:t>Sbox</a:t>
+            </a:r>
+            <a:r>
+              <a:rPr lang="en-US" altLang="zh-CN" dirty="0">
+                <a:hlinkClick r:id="rId5" action="ppaction://hlinkfile"/>
+              </a:rPr>
+              <a:t> Analysis: Applications to ECHO and </a:t>
+            </a:r>
+            <a:r>
+              <a:rPr lang="en-US" altLang="zh-CN" dirty="0" err="1">
+                <a:hlinkClick r:id="rId5" action="ppaction://hlinkfile"/>
+              </a:rPr>
+              <a:t>Grøstl</a:t>
+            </a:r>
+            <a:endParaRPr lang="en-US" altLang="zh-CN" dirty="0"/>
+          </a:p>
+          <a:p>
+            <a:pPr lvl="1"/>
+            <a:r>
+              <a:rPr lang="zh-CN" altLang="en-US" dirty="0"/>
+              <a:t>扩散不必是</a:t>
+            </a:r>
+            <a:r>
+              <a:rPr lang="en-US" altLang="zh-CN" dirty="0"/>
+              <a:t>1-8</a:t>
+            </a:r>
+            <a:r>
+              <a:rPr lang="zh-CN" altLang="en-US" dirty="0"/>
+              <a:t>的传播，也可以</a:t>
+            </a:r>
+            <a:r>
+              <a:rPr lang="en-US" altLang="zh-CN" dirty="0"/>
+              <a:t>4-5</a:t>
+            </a:r>
+          </a:p>
+          <a:p>
+            <a:r>
+              <a:rPr lang="en-US" altLang="zh-CN" dirty="0">
+                <a:hlinkClick r:id="rId6" action="ppaction://hlinkfile"/>
+              </a:rPr>
+              <a:t>How to Improve Rebound Attacks</a:t>
+            </a:r>
+            <a:endParaRPr lang="en-US" altLang="zh-CN" dirty="0"/>
+          </a:p>
+          <a:p>
+            <a:pPr lvl="1"/>
+            <a:r>
+              <a:rPr lang="zh-CN" altLang="en-US" dirty="0"/>
+              <a:t>中间一些步骤复杂度计算优化</a:t>
+            </a:r>
+            <a:endParaRPr lang="en-US" altLang="zh-CN" dirty="0"/>
+          </a:p>
+          <a:p>
+            <a:endParaRPr lang="zh-CN" altLang="en-US" dirty="0"/>
+          </a:p>
+        </p:txBody>
+      </p:sp>
+    </p:spTree>
+    <p:extLst>
+      <p:ext uri="{BB962C8B-B14F-4D97-AF65-F5344CB8AC3E}">
+        <p14:creationId xmlns:p14="http://schemas.microsoft.com/office/powerpoint/2010/main" val="1201894141"/>
+      </p:ext>
+    </p:extLst>
+  </p:cSld>
+  <p:clrMapOvr>
+    <a:masterClrMapping/>
+  </p:clrMapOvr>
+</p:sld>
+</file>
+
+<file path=ppt/slides/slide56.xml><?xml version="1.0" encoding="utf-8"?>
+<p:sld xmlns:a="http://schemas.openxmlformats.org/drawingml/2006/main" xmlns:r="http://schemas.openxmlformats.org/officeDocument/2006/relationships" xmlns:p="http://schemas.openxmlformats.org/presentationml/2006/main">
+  <p:cSld>
+    <p:spTree>
+      <p:nvGrpSpPr>
+        <p:cNvPr id="1" name=""/>
+        <p:cNvGrpSpPr/>
+        <p:nvPr/>
+      </p:nvGrpSpPr>
+      <p:grpSpPr>
+        <a:xfrm>
+          <a:off x="0" y="0"/>
+          <a:ext cx="0" cy="0"/>
+          <a:chOff x="0" y="0"/>
+          <a:chExt cx="0" cy="0"/>
+        </a:xfrm>
+      </p:grpSpPr>
+      <p:sp>
+        <p:nvSpPr>
+          <p:cNvPr id="2" name="标题 1">
+            <a:extLst>
+              <a:ext uri="{FF2B5EF4-FFF2-40B4-BE49-F238E27FC236}">
+                <a16:creationId xmlns:a16="http://schemas.microsoft.com/office/drawing/2014/main" id="{E60319EE-F6A6-4F1D-8E69-1087FD2A5441}"/>
+              </a:ext>
+            </a:extLst>
+          </p:cNvPr>
+          <p:cNvSpPr>
+            <a:spLocks noGrp="1"/>
+          </p:cNvSpPr>
+          <p:nvPr>
+            <p:ph type="title"/>
+          </p:nvPr>
+        </p:nvSpPr>
+        <p:spPr/>
+        <p:txBody>
+          <a:bodyPr/>
+          <a:lstStyle/>
+          <a:p>
+            <a:r>
+              <a:rPr lang="en-US" altLang="zh-CN" dirty="0"/>
+              <a:t>Integral</a:t>
+            </a:r>
+            <a:endParaRPr lang="zh-CN" altLang="en-US" dirty="0"/>
+          </a:p>
+        </p:txBody>
+      </p:sp>
+      <p:sp>
+        <p:nvSpPr>
+          <p:cNvPr id="3" name="内容占位符 2">
+            <a:extLst>
+              <a:ext uri="{FF2B5EF4-FFF2-40B4-BE49-F238E27FC236}">
+                <a16:creationId xmlns:a16="http://schemas.microsoft.com/office/drawing/2014/main" id="{5DBD95EE-C6C4-41FB-825B-4577A6D135FB}"/>
+              </a:ext>
+            </a:extLst>
+          </p:cNvPr>
+          <p:cNvSpPr>
+            <a:spLocks noGrp="1"/>
+          </p:cNvSpPr>
+          <p:nvPr>
+            <p:ph idx="1"/>
+          </p:nvPr>
+        </p:nvSpPr>
+        <p:spPr/>
+        <p:txBody>
+          <a:bodyPr/>
+          <a:lstStyle/>
+          <a:p>
+            <a:r>
+              <a:rPr lang="zh-CN" altLang="en-US" dirty="0"/>
+              <a:t>基于可分性</a:t>
+            </a:r>
+            <a:endParaRPr lang="en-US" altLang="zh-CN" dirty="0"/>
+          </a:p>
+          <a:p>
+            <a:r>
+              <a:rPr lang="zh-CN" altLang="en-US" dirty="0"/>
+              <a:t>统计积分</a:t>
+            </a:r>
+          </a:p>
+        </p:txBody>
+      </p:sp>
+    </p:spTree>
+    <p:extLst>
+      <p:ext uri="{BB962C8B-B14F-4D97-AF65-F5344CB8AC3E}">
+        <p14:creationId xmlns:p14="http://schemas.microsoft.com/office/powerpoint/2010/main" val="4033074066"/>
+      </p:ext>
+    </p:extLst>
+  </p:cSld>
+  <p:clrMapOvr>
+    <a:masterClrMapping/>
+  </p:clrMapOvr>
+</p:sld>
+</file>
+
+<file path=ppt/slides/slide57.xml><?xml version="1.0" encoding="utf-8"?>
+<p:sld xmlns:a="http://schemas.openxmlformats.org/drawingml/2006/main" xmlns:r="http://schemas.openxmlformats.org/officeDocument/2006/relationships" xmlns:p="http://schemas.openxmlformats.org/presentationml/2006/main">
+  <p:cSld>
+    <p:spTree>
+      <p:nvGrpSpPr>
+        <p:cNvPr id="1" name=""/>
+        <p:cNvGrpSpPr/>
+        <p:nvPr/>
+      </p:nvGrpSpPr>
+      <p:grpSpPr>
+        <a:xfrm>
+          <a:off x="0" y="0"/>
+          <a:ext cx="0" cy="0"/>
+          <a:chOff x="0" y="0"/>
+          <a:chExt cx="0" cy="0"/>
+        </a:xfrm>
+      </p:grpSpPr>
+      <p:sp>
+        <p:nvSpPr>
+          <p:cNvPr id="2" name="标题 1">
+            <a:extLst>
+              <a:ext uri="{FF2B5EF4-FFF2-40B4-BE49-F238E27FC236}">
+                <a16:creationId xmlns:a16="http://schemas.microsoft.com/office/drawing/2014/main" id="{6B018774-7A5F-4049-8992-D61E9B91CA84}"/>
+              </a:ext>
+            </a:extLst>
+          </p:cNvPr>
+          <p:cNvSpPr>
+            <a:spLocks noGrp="1"/>
+          </p:cNvSpPr>
+          <p:nvPr>
+            <p:ph type="title"/>
+          </p:nvPr>
+        </p:nvSpPr>
+        <p:spPr/>
+        <p:txBody>
+          <a:bodyPr/>
+          <a:lstStyle/>
+          <a:p>
+            <a:r>
+              <a:rPr lang="en-US" altLang="zh-CN" dirty="0"/>
+              <a:t>Zero-sum</a:t>
+            </a:r>
+            <a:endParaRPr lang="zh-CN" altLang="en-US" dirty="0"/>
+          </a:p>
+        </p:txBody>
+      </p:sp>
+      <p:sp>
+        <p:nvSpPr>
+          <p:cNvPr id="3" name="内容占位符 2">
+            <a:extLst>
+              <a:ext uri="{FF2B5EF4-FFF2-40B4-BE49-F238E27FC236}">
+                <a16:creationId xmlns:a16="http://schemas.microsoft.com/office/drawing/2014/main" id="{10794462-D953-4A44-A9B8-388D32A03AE4}"/>
+              </a:ext>
+            </a:extLst>
+          </p:cNvPr>
+          <p:cNvSpPr>
+            <a:spLocks noGrp="1"/>
+          </p:cNvSpPr>
+          <p:nvPr>
+            <p:ph idx="1"/>
+          </p:nvPr>
+        </p:nvSpPr>
+        <p:spPr/>
+        <p:txBody>
+          <a:bodyPr/>
+          <a:lstStyle/>
+          <a:p>
+            <a:r>
+              <a:rPr lang="zh-CN" altLang="en-US" dirty="0"/>
+              <a:t>代数度估计</a:t>
+            </a:r>
+            <a:endParaRPr lang="en-US" altLang="zh-CN" dirty="0"/>
+          </a:p>
+          <a:p>
+            <a:pPr lvl="1"/>
+            <a:r>
+              <a:rPr lang="zh-CN" altLang="en-US" dirty="0"/>
+              <a:t>代数度上界</a:t>
+            </a:r>
+            <a:endParaRPr lang="en-US" altLang="zh-CN" dirty="0"/>
+          </a:p>
+          <a:p>
+            <a:r>
+              <a:rPr lang="en-US" altLang="zh-CN" dirty="0" err="1"/>
+              <a:t>SymSum</a:t>
+            </a:r>
+            <a:endParaRPr lang="zh-CN" altLang="en-US" dirty="0"/>
+          </a:p>
+        </p:txBody>
+      </p:sp>
+    </p:spTree>
+    <p:extLst>
+      <p:ext uri="{BB962C8B-B14F-4D97-AF65-F5344CB8AC3E}">
+        <p14:creationId xmlns:p14="http://schemas.microsoft.com/office/powerpoint/2010/main" val="4060276925"/>
+      </p:ext>
+    </p:extLst>
+  </p:cSld>
+  <p:clrMapOvr>
+    <a:masterClrMapping/>
+  </p:clrMapOvr>
+</p:sld>
+</file>
+
+<file path=ppt/slides/slide58.xml><?xml version="1.0" encoding="utf-8"?>
+<p:sld xmlns:a="http://schemas.openxmlformats.org/drawingml/2006/main" xmlns:r="http://schemas.openxmlformats.org/officeDocument/2006/relationships" xmlns:p="http://schemas.openxmlformats.org/presentationml/2006/main">
+  <p:cSld>
+    <p:spTree>
+      <p:nvGrpSpPr>
+        <p:cNvPr id="1" name=""/>
+        <p:cNvGrpSpPr/>
+        <p:nvPr/>
+      </p:nvGrpSpPr>
+      <p:grpSpPr>
+        <a:xfrm>
+          <a:off x="0" y="0"/>
+          <a:ext cx="0" cy="0"/>
+          <a:chOff x="0" y="0"/>
+          <a:chExt cx="0" cy="0"/>
+        </a:xfrm>
+      </p:grpSpPr>
+      <p:sp>
+        <p:nvSpPr>
+          <p:cNvPr id="2" name="标题 1">
+            <a:extLst>
+              <a:ext uri="{FF2B5EF4-FFF2-40B4-BE49-F238E27FC236}">
+                <a16:creationId xmlns:a16="http://schemas.microsoft.com/office/drawing/2014/main" id="{FA8DCA41-37D8-459E-BF90-70D554989B2F}"/>
+              </a:ext>
+            </a:extLst>
+          </p:cNvPr>
+          <p:cNvSpPr>
+            <a:spLocks noGrp="1"/>
+          </p:cNvSpPr>
+          <p:nvPr>
+            <p:ph type="title"/>
+          </p:nvPr>
+        </p:nvSpPr>
+        <p:spPr/>
+        <p:txBody>
+          <a:bodyPr/>
+          <a:lstStyle/>
+          <a:p>
+            <a:r>
+              <a:rPr lang="en-US" altLang="zh-CN" dirty="0"/>
+              <a:t>Cube</a:t>
+            </a:r>
+            <a:endParaRPr lang="zh-CN" altLang="en-US" dirty="0"/>
+          </a:p>
+        </p:txBody>
+      </p:sp>
+      <p:sp>
+        <p:nvSpPr>
+          <p:cNvPr id="3" name="内容占位符 2">
+            <a:extLst>
+              <a:ext uri="{FF2B5EF4-FFF2-40B4-BE49-F238E27FC236}">
+                <a16:creationId xmlns:a16="http://schemas.microsoft.com/office/drawing/2014/main" id="{41ADF947-DEAB-4DF9-981D-B37D7CF32B9C}"/>
+              </a:ext>
+            </a:extLst>
+          </p:cNvPr>
+          <p:cNvSpPr>
+            <a:spLocks noGrp="1"/>
+          </p:cNvSpPr>
+          <p:nvPr>
+            <p:ph idx="1"/>
+          </p:nvPr>
+        </p:nvSpPr>
+        <p:spPr/>
+        <p:txBody>
+          <a:bodyPr/>
+          <a:lstStyle/>
+          <a:p>
+            <a:endParaRPr lang="zh-CN" altLang="en-US"/>
+          </a:p>
+        </p:txBody>
+      </p:sp>
+    </p:spTree>
+    <p:extLst>
+      <p:ext uri="{BB962C8B-B14F-4D97-AF65-F5344CB8AC3E}">
+        <p14:creationId xmlns:p14="http://schemas.microsoft.com/office/powerpoint/2010/main" val="1550536361"/>
+      </p:ext>
+    </p:extLst>
+  </p:cSld>
+  <p:clrMapOvr>
+    <a:masterClrMapping/>
+  </p:clrMapOvr>
+</p:sld>
+</file>
+
+<file path=ppt/slides/slide59.xml><?xml version="1.0" encoding="utf-8"?>
 <p:sld xmlns:a="http://schemas.openxmlformats.org/drawingml/2006/main" xmlns:r="http://schemas.openxmlformats.org/officeDocument/2006/relationships" xmlns:p="http://schemas.openxmlformats.org/presentationml/2006/main">
   <p:cSld>
     <p:bg>
@@ -19138,12 +19823,18 @@
       </p:sp>
       <p:sp>
         <p:nvSpPr>
-          <p:cNvPr id="3" name="内容占位符 2"/>
+          <p:cNvPr id="4" name="文本占位符 3">
+            <a:extLst>
+              <a:ext uri="{FF2B5EF4-FFF2-40B4-BE49-F238E27FC236}">
+                <a16:creationId xmlns:a16="http://schemas.microsoft.com/office/drawing/2014/main" id="{3B1F60F1-E6D6-4864-A669-68E8FC285A25}"/>
+              </a:ext>
+            </a:extLst>
+          </p:cNvPr>
           <p:cNvSpPr>
             <a:spLocks noGrp="1"/>
           </p:cNvSpPr>
           <p:nvPr>
-            <p:ph idx="1"/>
+            <p:ph type="body" idx="1"/>
           </p:nvPr>
         </p:nvSpPr>
         <p:spPr/>

</xml_diff>